<commit_message>
Repositories tweaks after run
</commit_message>
<xml_diff>
--- a/instructors/Repositories.pptx
+++ b/instructors/Repositories.pptx
@@ -5,25 +5,27 @@
     <p:sldMasterId id="2147483648" r:id="rId1"/>
   </p:sldMasterIdLst>
   <p:notesMasterIdLst>
-    <p:notesMasterId r:id="rId18"/>
+    <p:notesMasterId r:id="rId20"/>
   </p:notesMasterIdLst>
   <p:sldIdLst>
     <p:sldId id="280" r:id="rId2"/>
     <p:sldId id="293" r:id="rId3"/>
-    <p:sldId id="294" r:id="rId4"/>
-    <p:sldId id="259" r:id="rId5"/>
+    <p:sldId id="259" r:id="rId4"/>
+    <p:sldId id="309" r:id="rId5"/>
     <p:sldId id="292" r:id="rId6"/>
     <p:sldId id="295" r:id="rId7"/>
     <p:sldId id="298" r:id="rId8"/>
     <p:sldId id="297" r:id="rId9"/>
     <p:sldId id="299" r:id="rId10"/>
-    <p:sldId id="300" r:id="rId11"/>
-    <p:sldId id="301" r:id="rId12"/>
+    <p:sldId id="301" r:id="rId11"/>
+    <p:sldId id="300" r:id="rId12"/>
     <p:sldId id="302" r:id="rId13"/>
     <p:sldId id="303" r:id="rId14"/>
-    <p:sldId id="304" r:id="rId15"/>
-    <p:sldId id="306" r:id="rId16"/>
-    <p:sldId id="296" r:id="rId17"/>
+    <p:sldId id="308" r:id="rId15"/>
+    <p:sldId id="304" r:id="rId16"/>
+    <p:sldId id="307" r:id="rId17"/>
+    <p:sldId id="306" r:id="rId18"/>
+    <p:sldId id="296" r:id="rId19"/>
   </p:sldIdLst>
   <p:sldSz cx="12192000" cy="6858000"/>
   <p:notesSz cx="6858000" cy="9144000"/>
@@ -212,7 +214,7 @@
           <a:p>
             <a:fld id="{585C48AE-4A1E-9A43-835F-510354165F99}" type="datetimeFigureOut">
               <a:rPr lang="en-GB" smtClean="0"/>
-              <a:t>01/10/2021</a:t>
+              <a:t>04/10/2021</a:t>
             </a:fld>
             <a:endParaRPr lang="en-GB"/>
           </a:p>
@@ -628,7 +630,7 @@
           <a:p>
             <a:fld id="{5913FB77-D8DB-4AB9-8EA5-EE8C3B57A5E1}" type="datetimeFigureOut">
               <a:rPr lang="en-GB" smtClean="0"/>
-              <a:t>01/10/2021</a:t>
+              <a:t>04/10/2021</a:t>
             </a:fld>
             <a:endParaRPr lang="en-GB"/>
           </a:p>
@@ -828,7 +830,7 @@
           <a:p>
             <a:fld id="{5913FB77-D8DB-4AB9-8EA5-EE8C3B57A5E1}" type="datetimeFigureOut">
               <a:rPr lang="en-GB" smtClean="0"/>
-              <a:t>01/10/2021</a:t>
+              <a:t>04/10/2021</a:t>
             </a:fld>
             <a:endParaRPr lang="en-GB"/>
           </a:p>
@@ -1038,7 +1040,7 @@
           <a:p>
             <a:fld id="{5913FB77-D8DB-4AB9-8EA5-EE8C3B57A5E1}" type="datetimeFigureOut">
               <a:rPr lang="en-GB" smtClean="0"/>
-              <a:t>01/10/2021</a:t>
+              <a:t>04/10/2021</a:t>
             </a:fld>
             <a:endParaRPr lang="en-GB"/>
           </a:p>
@@ -1238,7 +1240,7 @@
           <a:p>
             <a:fld id="{5913FB77-D8DB-4AB9-8EA5-EE8C3B57A5E1}" type="datetimeFigureOut">
               <a:rPr lang="en-GB" smtClean="0"/>
-              <a:t>01/10/2021</a:t>
+              <a:t>04/10/2021</a:t>
             </a:fld>
             <a:endParaRPr lang="en-GB"/>
           </a:p>
@@ -1514,7 +1516,7 @@
           <a:p>
             <a:fld id="{5913FB77-D8DB-4AB9-8EA5-EE8C3B57A5E1}" type="datetimeFigureOut">
               <a:rPr lang="en-GB" smtClean="0"/>
-              <a:t>01/10/2021</a:t>
+              <a:t>04/10/2021</a:t>
             </a:fld>
             <a:endParaRPr lang="en-GB"/>
           </a:p>
@@ -1782,7 +1784,7 @@
           <a:p>
             <a:fld id="{5913FB77-D8DB-4AB9-8EA5-EE8C3B57A5E1}" type="datetimeFigureOut">
               <a:rPr lang="en-GB" smtClean="0"/>
-              <a:t>01/10/2021</a:t>
+              <a:t>04/10/2021</a:t>
             </a:fld>
             <a:endParaRPr lang="en-GB"/>
           </a:p>
@@ -2197,7 +2199,7 @@
           <a:p>
             <a:fld id="{5913FB77-D8DB-4AB9-8EA5-EE8C3B57A5E1}" type="datetimeFigureOut">
               <a:rPr lang="en-GB" smtClean="0"/>
-              <a:t>01/10/2021</a:t>
+              <a:t>04/10/2021</a:t>
             </a:fld>
             <a:endParaRPr lang="en-GB"/>
           </a:p>
@@ -2339,7 +2341,7 @@
           <a:p>
             <a:fld id="{5913FB77-D8DB-4AB9-8EA5-EE8C3B57A5E1}" type="datetimeFigureOut">
               <a:rPr lang="en-GB" smtClean="0"/>
-              <a:t>01/10/2021</a:t>
+              <a:t>04/10/2021</a:t>
             </a:fld>
             <a:endParaRPr lang="en-GB"/>
           </a:p>
@@ -2452,7 +2454,7 @@
           <a:p>
             <a:fld id="{5913FB77-D8DB-4AB9-8EA5-EE8C3B57A5E1}" type="datetimeFigureOut">
               <a:rPr lang="en-GB" smtClean="0"/>
-              <a:t>01/10/2021</a:t>
+              <a:t>04/10/2021</a:t>
             </a:fld>
             <a:endParaRPr lang="en-GB"/>
           </a:p>
@@ -2765,7 +2767,7 @@
           <a:p>
             <a:fld id="{5913FB77-D8DB-4AB9-8EA5-EE8C3B57A5E1}" type="datetimeFigureOut">
               <a:rPr lang="en-GB" smtClean="0"/>
-              <a:t>01/10/2021</a:t>
+              <a:t>04/10/2021</a:t>
             </a:fld>
             <a:endParaRPr lang="en-GB"/>
           </a:p>
@@ -3054,7 +3056,7 @@
           <a:p>
             <a:fld id="{5913FB77-D8DB-4AB9-8EA5-EE8C3B57A5E1}" type="datetimeFigureOut">
               <a:rPr lang="en-GB" smtClean="0"/>
-              <a:t>01/10/2021</a:t>
+              <a:t>04/10/2021</a:t>
             </a:fld>
             <a:endParaRPr lang="en-GB"/>
           </a:p>
@@ -3297,7 +3299,7 @@
           <a:p>
             <a:fld id="{5913FB77-D8DB-4AB9-8EA5-EE8C3B57A5E1}" type="datetimeFigureOut">
               <a:rPr lang="en-GB" smtClean="0"/>
-              <a:t>01/10/2021</a:t>
+              <a:t>04/10/2021</a:t>
             </a:fld>
             <a:endParaRPr lang="en-GB"/>
           </a:p>
@@ -3906,6 +3908,13 @@
   <p:clrMapOvr>
     <a:masterClrMapping/>
   </p:clrMapOvr>
+  <p:timing>
+    <p:tnLst>
+      <p:par>
+        <p:cTn id="1" dur="indefinite" restart="never" nodeType="tmRoot"/>
+      </p:par>
+    </p:tnLst>
+  </p:timing>
 </p:sld>
 </file>
 
@@ -3975,6 +3984,157 @@
       </p:pic>
       <p:sp>
         <p:nvSpPr>
+          <p:cNvPr id="2" name="Rectangle 1"/>
+          <p:cNvSpPr/>
+          <p:nvPr/>
+        </p:nvSpPr>
+        <p:spPr>
+          <a:xfrm>
+            <a:off x="742384" y="2064189"/>
+            <a:ext cx="10981854" cy="2585323"/>
+          </a:xfrm>
+          <a:prstGeom prst="rect">
+            <a:avLst/>
+          </a:prstGeom>
+        </p:spPr>
+        <p:txBody>
+          <a:bodyPr wrap="square">
+            <a:spAutoFit/>
+          </a:bodyPr>
+          <a:lstStyle/>
+          <a:p>
+            <a:pPr marL="285750" indent="-285750">
+              <a:buFont typeface="Arial" panose="020B0604020202020204" pitchFamily="34" charset="0"/>
+              <a:buChar char="•"/>
+            </a:pPr>
+            <a:r>
+              <a:rPr lang="en-GB" dirty="0">
+                <a:solidFill>
+                  <a:srgbClr val="0070C0"/>
+                </a:solidFill>
+              </a:rPr>
+              <a:t>Higher </a:t>
+            </a:r>
+            <a:r>
+              <a:rPr lang="en-GB" dirty="0" smtClean="0">
+                <a:solidFill>
+                  <a:srgbClr val="0070C0"/>
+                </a:solidFill>
+              </a:rPr>
+              <a:t>exposure</a:t>
+            </a:r>
+            <a:endParaRPr lang="pl-PL" dirty="0" smtClean="0">
+              <a:solidFill>
+                <a:srgbClr val="0070C0"/>
+              </a:solidFill>
+            </a:endParaRPr>
+          </a:p>
+          <a:p>
+            <a:pPr marL="285750" indent="-285750">
+              <a:buFont typeface="Arial" panose="020B0604020202020204" pitchFamily="34" charset="0"/>
+              <a:buChar char="•"/>
+            </a:pPr>
+            <a:r>
+              <a:rPr lang="pl-PL" dirty="0" smtClean="0">
+                <a:solidFill>
+                  <a:srgbClr val="0070C0"/>
+                </a:solidFill>
+              </a:rPr>
+              <a:t>Data specific features (e.g. Visulization)</a:t>
+            </a:r>
+          </a:p>
+          <a:p>
+            <a:pPr marL="285750" indent="-285750">
+              <a:buFont typeface="Arial" panose="020B0604020202020204" pitchFamily="34" charset="0"/>
+              <a:buChar char="•"/>
+            </a:pPr>
+            <a:r>
+              <a:rPr lang="pl-PL" dirty="0" smtClean="0">
+                <a:solidFill>
+                  <a:srgbClr val="0070C0"/>
+                </a:solidFill>
+              </a:rPr>
+              <a:t>Enforced minimal metadata</a:t>
+            </a:r>
+          </a:p>
+          <a:p>
+            <a:pPr marL="285750" indent="-285750">
+              <a:buFont typeface="Arial" panose="020B0604020202020204" pitchFamily="34" charset="0"/>
+              <a:buChar char="•"/>
+            </a:pPr>
+            <a:r>
+              <a:rPr lang="pl-PL" dirty="0" smtClean="0">
+                <a:solidFill>
+                  <a:srgbClr val="0070C0"/>
+                </a:solidFill>
+              </a:rPr>
+              <a:t>API for data retrival / agregation /searching</a:t>
+            </a:r>
+          </a:p>
+          <a:p>
+            <a:pPr marL="285750" indent="-285750">
+              <a:buFont typeface="Arial" panose="020B0604020202020204" pitchFamily="34" charset="0"/>
+              <a:buChar char="•"/>
+            </a:pPr>
+            <a:r>
+              <a:rPr lang="pl-PL" dirty="0" smtClean="0">
+                <a:solidFill>
+                  <a:srgbClr val="0070C0"/>
+                </a:solidFill>
+              </a:rPr>
+              <a:t>Curated data</a:t>
+            </a:r>
+          </a:p>
+          <a:p>
+            <a:pPr marL="285750" indent="-285750">
+              <a:buFont typeface="Arial" panose="020B0604020202020204" pitchFamily="34" charset="0"/>
+              <a:buChar char="•"/>
+            </a:pPr>
+            <a:r>
+              <a:rPr lang="pl-PL" dirty="0" smtClean="0">
+                <a:solidFill>
+                  <a:srgbClr val="0070C0"/>
+                </a:solidFill>
+              </a:rPr>
+              <a:t>Better searching</a:t>
+            </a:r>
+          </a:p>
+          <a:p>
+            <a:pPr marL="285750" indent="-285750">
+              <a:buFont typeface="Arial" panose="020B0604020202020204" pitchFamily="34" charset="0"/>
+              <a:buChar char="•"/>
+            </a:pPr>
+            <a:r>
+              <a:rPr lang="pl-PL" dirty="0" smtClean="0">
+                <a:solidFill>
+                  <a:srgbClr val="0070C0"/>
+                </a:solidFill>
+              </a:rPr>
+              <a:t>Interlinking between data types</a:t>
+            </a:r>
+          </a:p>
+          <a:p>
+            <a:endParaRPr lang="pl-PL" dirty="0" smtClean="0">
+              <a:solidFill>
+                <a:srgbClr val="0070C0"/>
+              </a:solidFill>
+            </a:endParaRPr>
+          </a:p>
+          <a:p>
+            <a:pPr marL="285750" indent="-285750">
+              <a:buFont typeface="Arial" panose="020B0604020202020204" pitchFamily="34" charset="0"/>
+              <a:buChar char="•"/>
+            </a:pPr>
+            <a:endParaRPr lang="en-GB" dirty="0">
+              <a:solidFill>
+                <a:srgbClr val="0070C0"/>
+              </a:solidFill>
+            </a:endParaRPr>
+          </a:p>
+        </p:txBody>
+      </p:sp>
+      <p:sp>
+        <p:nvSpPr>
           <p:cNvPr id="5" name="Title 1">
             <a:extLst>
               <a:ext uri="{FF2B5EF4-FFF2-40B4-BE49-F238E27FC236}">
@@ -4018,13 +4178,20 @@
     </p:spTree>
     <p:extLst>
       <p:ext uri="{BB962C8B-B14F-4D97-AF65-F5344CB8AC3E}">
-        <p14:creationId xmlns:p14="http://schemas.microsoft.com/office/powerpoint/2010/main" val="4258755406"/>
+        <p14:creationId xmlns:p14="http://schemas.microsoft.com/office/powerpoint/2010/main" val="1646562172"/>
       </p:ext>
     </p:extLst>
   </p:cSld>
   <p:clrMapOvr>
     <a:masterClrMapping/>
   </p:clrMapOvr>
+  <p:timing>
+    <p:tnLst>
+      <p:par>
+        <p:cTn id="1" dur="indefinite" restart="never" nodeType="tmRoot"/>
+      </p:par>
+    </p:tnLst>
+  </p:timing>
 </p:sld>
 </file>
 
@@ -4094,14 +4261,56 @@
       </p:pic>
       <p:sp>
         <p:nvSpPr>
-          <p:cNvPr id="2" name="Rectangle 1"/>
+          <p:cNvPr id="5" name="Title 1">
+            <a:extLst>
+              <a:ext uri="{FF2B5EF4-FFF2-40B4-BE49-F238E27FC236}">
+                <a16:creationId xmlns:a16="http://schemas.microsoft.com/office/drawing/2014/main" id="{775BFE92-9990-4094-B7B2-01514614F16E}"/>
+              </a:ext>
+            </a:extLst>
+          </p:cNvPr>
+          <p:cNvSpPr>
+            <a:spLocks noGrp="1"/>
+          </p:cNvSpPr>
+          <p:nvPr>
+            <p:ph type="title"/>
+          </p:nvPr>
+        </p:nvSpPr>
+        <p:spPr>
+          <a:xfrm>
+            <a:off x="838200" y="365125"/>
+            <a:ext cx="10515600" cy="1325563"/>
+          </a:xfrm>
+        </p:spPr>
+        <p:txBody>
+          <a:bodyPr/>
+          <a:lstStyle/>
+          <a:p>
+            <a:r>
+              <a:rPr lang="pl-PL" dirty="0" smtClean="0">
+                <a:solidFill>
+                  <a:srgbClr val="0070C0"/>
+                </a:solidFill>
+              </a:rPr>
+              <a:t>Domain specific repositories</a:t>
+            </a:r>
+            <a:endParaRPr lang="en-GB" dirty="0">
+              <a:solidFill>
+                <a:srgbClr val="0070C0"/>
+              </a:solidFill>
+            </a:endParaRPr>
+          </a:p>
+        </p:txBody>
+      </p:sp>
+      <p:sp>
+        <p:nvSpPr>
+          <p:cNvPr id="6" name="Rectangle 5"/>
           <p:cNvSpPr/>
           <p:nvPr/>
         </p:nvSpPr>
         <p:spPr>
           <a:xfrm>
             <a:off x="742384" y="2064189"/>
-            <a:ext cx="10981854" cy="2585323"/>
+            <a:ext cx="10981854" cy="646331"/>
           </a:xfrm>
           <a:prstGeom prst="rect">
             <a:avLst/>
@@ -4113,117 +4322,14 @@
           </a:bodyPr>
           <a:lstStyle/>
           <a:p>
-            <a:pPr marL="285750" indent="-285750">
-              <a:buFont typeface="Arial" panose="020B0604020202020204" pitchFamily="34" charset="0"/>
-              <a:buChar char="•"/>
-            </a:pPr>
-            <a:r>
-              <a:rPr lang="en-GB" dirty="0">
-                <a:solidFill>
-                  <a:srgbClr val="0070C0"/>
-                </a:solidFill>
-              </a:rPr>
-              <a:t>Higher </a:t>
-            </a:r>
-            <a:r>
-              <a:rPr lang="en-GB" dirty="0" smtClean="0">
-                <a:solidFill>
-                  <a:srgbClr val="0070C0"/>
-                </a:solidFill>
-              </a:rPr>
-              <a:t>exposure</a:t>
-            </a:r>
-            <a:endParaRPr lang="pl-PL" dirty="0" smtClean="0">
-              <a:solidFill>
-                <a:srgbClr val="0070C0"/>
-              </a:solidFill>
-            </a:endParaRPr>
-          </a:p>
-          <a:p>
-            <a:pPr marL="285750" indent="-285750">
-              <a:buFont typeface="Arial" panose="020B0604020202020204" pitchFamily="34" charset="0"/>
-              <a:buChar char="•"/>
-            </a:pPr>
             <a:r>
               <a:rPr lang="pl-PL" dirty="0" smtClean="0">
                 <a:solidFill>
                   <a:srgbClr val="0070C0"/>
                 </a:solidFill>
               </a:rPr>
-              <a:t>Data specific features (e.g. Visulization)</a:t>
-            </a:r>
-          </a:p>
-          <a:p>
-            <a:pPr marL="285750" indent="-285750">
-              <a:buFont typeface="Arial" panose="020B0604020202020204" pitchFamily="34" charset="0"/>
-              <a:buChar char="•"/>
-            </a:pPr>
-            <a:r>
-              <a:rPr lang="pl-PL" dirty="0" smtClean="0">
-                <a:solidFill>
-                  <a:srgbClr val="0070C0"/>
-                </a:solidFill>
-              </a:rPr>
-              <a:t>Enforced minimal metadata</a:t>
-            </a:r>
-          </a:p>
-          <a:p>
-            <a:pPr marL="285750" indent="-285750">
-              <a:buFont typeface="Arial" panose="020B0604020202020204" pitchFamily="34" charset="0"/>
-              <a:buChar char="•"/>
-            </a:pPr>
-            <a:r>
-              <a:rPr lang="pl-PL" dirty="0" smtClean="0">
-                <a:solidFill>
-                  <a:srgbClr val="0070C0"/>
-                </a:solidFill>
-              </a:rPr>
-              <a:t>API for data retrival / agregation /searching</a:t>
-            </a:r>
-          </a:p>
-          <a:p>
-            <a:pPr marL="285750" indent="-285750">
-              <a:buFont typeface="Arial" panose="020B0604020202020204" pitchFamily="34" charset="0"/>
-              <a:buChar char="•"/>
-            </a:pPr>
-            <a:r>
-              <a:rPr lang="pl-PL" dirty="0" smtClean="0">
-                <a:solidFill>
-                  <a:srgbClr val="0070C0"/>
-                </a:solidFill>
-              </a:rPr>
-              <a:t>Curated data</a:t>
-            </a:r>
-          </a:p>
-          <a:p>
-            <a:pPr marL="285750" indent="-285750">
-              <a:buFont typeface="Arial" panose="020B0604020202020204" pitchFamily="34" charset="0"/>
-              <a:buChar char="•"/>
-            </a:pPr>
-            <a:r>
-              <a:rPr lang="pl-PL" dirty="0" smtClean="0">
-                <a:solidFill>
-                  <a:srgbClr val="0070C0"/>
-                </a:solidFill>
-              </a:rPr>
-              <a:t>Better searching</a:t>
-            </a:r>
-          </a:p>
-          <a:p>
-            <a:pPr marL="285750" indent="-285750">
-              <a:buFont typeface="Arial" panose="020B0604020202020204" pitchFamily="34" charset="0"/>
-              <a:buChar char="•"/>
-            </a:pPr>
-            <a:r>
-              <a:rPr lang="pl-PL" dirty="0" smtClean="0">
-                <a:solidFill>
-                  <a:srgbClr val="0070C0"/>
-                </a:solidFill>
-              </a:rPr>
-              <a:t>Interlinking between data types</a:t>
-            </a:r>
-          </a:p>
-          <a:p>
+              <a:t>Exercise</a:t>
+            </a:r>
             <a:endParaRPr lang="pl-PL" dirty="0" smtClean="0">
               <a:solidFill>
                 <a:srgbClr val="0070C0"/>
@@ -4243,58 +4349,23 @@
           </a:p>
         </p:txBody>
       </p:sp>
-      <p:sp>
-        <p:nvSpPr>
-          <p:cNvPr id="5" name="Title 1">
-            <a:extLst>
-              <a:ext uri="{FF2B5EF4-FFF2-40B4-BE49-F238E27FC236}">
-                <a16:creationId xmlns:a16="http://schemas.microsoft.com/office/drawing/2014/main" id="{775BFE92-9990-4094-B7B2-01514614F16E}"/>
-              </a:ext>
-            </a:extLst>
-          </p:cNvPr>
-          <p:cNvSpPr>
-            <a:spLocks noGrp="1"/>
-          </p:cNvSpPr>
-          <p:nvPr>
-            <p:ph type="title"/>
-          </p:nvPr>
-        </p:nvSpPr>
-        <p:spPr>
-          <a:xfrm>
-            <a:off x="838200" y="365125"/>
-            <a:ext cx="10515600" cy="1325563"/>
-          </a:xfrm>
-        </p:spPr>
-        <p:txBody>
-          <a:bodyPr/>
-          <a:lstStyle/>
-          <a:p>
-            <a:r>
-              <a:rPr lang="pl-PL" dirty="0" smtClean="0">
-                <a:solidFill>
-                  <a:srgbClr val="0070C0"/>
-                </a:solidFill>
-              </a:rPr>
-              <a:t>Domain specific repositories</a:t>
-            </a:r>
-            <a:endParaRPr lang="en-GB" dirty="0">
-              <a:solidFill>
-                <a:srgbClr val="0070C0"/>
-              </a:solidFill>
-            </a:endParaRPr>
-          </a:p>
-        </p:txBody>
-      </p:sp>
     </p:spTree>
     <p:extLst>
       <p:ext uri="{BB962C8B-B14F-4D97-AF65-F5344CB8AC3E}">
-        <p14:creationId xmlns:p14="http://schemas.microsoft.com/office/powerpoint/2010/main" val="1646562172"/>
+        <p14:creationId xmlns:p14="http://schemas.microsoft.com/office/powerpoint/2010/main" val="4258755406"/>
       </p:ext>
     </p:extLst>
   </p:cSld>
   <p:clrMapOvr>
     <a:masterClrMapping/>
   </p:clrMapOvr>
+  <p:timing>
+    <p:tnLst>
+      <p:par>
+        <p:cTn id="1" dur="indefinite" restart="never" nodeType="tmRoot"/>
+      </p:par>
+    </p:tnLst>
+  </p:timing>
 </p:sld>
 </file>
 
@@ -4767,6 +4838,13 @@
   <p:clrMapOvr>
     <a:masterClrMapping/>
   </p:clrMapOvr>
+  <p:timing>
+    <p:tnLst>
+      <p:par>
+        <p:cTn id="1" dur="indefinite" restart="never" nodeType="tmRoot"/>
+      </p:par>
+    </p:tnLst>
+  </p:timing>
 </p:sld>
 </file>
 
@@ -4843,7 +4921,7 @@
         <p:spPr>
           <a:xfrm>
             <a:off x="742384" y="2064189"/>
-            <a:ext cx="10981854" cy="646331"/>
+            <a:ext cx="10981854" cy="2862322"/>
           </a:xfrm>
           <a:prstGeom prst="rect">
             <a:avLst/>
@@ -4864,7 +4942,103 @@
                   <a:srgbClr val="0070C0"/>
                 </a:solidFill>
               </a:rPr>
-              <a:t>FAIRSharing.org – search engine</a:t>
+              <a:t>FAIRSharing.org – search </a:t>
+            </a:r>
+            <a:r>
+              <a:rPr lang="pl-PL" dirty="0" smtClean="0">
+                <a:solidFill>
+                  <a:srgbClr val="0070C0"/>
+                </a:solidFill>
+              </a:rPr>
+              <a:t>engine</a:t>
+            </a:r>
+          </a:p>
+          <a:p>
+            <a:endParaRPr lang="pl-PL" dirty="0">
+              <a:solidFill>
+                <a:srgbClr val="0070C0"/>
+              </a:solidFill>
+            </a:endParaRPr>
+          </a:p>
+          <a:p>
+            <a:endParaRPr lang="pl-PL" dirty="0" smtClean="0">
+              <a:solidFill>
+                <a:srgbClr val="0070C0"/>
+              </a:solidFill>
+            </a:endParaRPr>
+          </a:p>
+          <a:p>
+            <a:pPr marL="285750" indent="-285750">
+              <a:buFontTx/>
+              <a:buChar char="-"/>
+            </a:pPr>
+            <a:r>
+              <a:rPr lang="pl-PL" dirty="0" smtClean="0">
+                <a:solidFill>
+                  <a:srgbClr val="0070C0"/>
+                </a:solidFill>
+              </a:rPr>
+              <a:t>Repositories</a:t>
+            </a:r>
+          </a:p>
+          <a:p>
+            <a:pPr marL="285750" indent="-285750">
+              <a:buFontTx/>
+              <a:buChar char="-"/>
+            </a:pPr>
+            <a:r>
+              <a:rPr lang="pl-PL" dirty="0" smtClean="0">
+                <a:solidFill>
+                  <a:srgbClr val="0070C0"/>
+                </a:solidFill>
+              </a:rPr>
+              <a:t>Data standards</a:t>
+            </a:r>
+          </a:p>
+          <a:p>
+            <a:pPr marL="285750" indent="-285750">
+              <a:buFontTx/>
+              <a:buChar char="-"/>
+            </a:pPr>
+            <a:r>
+              <a:rPr lang="pl-PL" dirty="0" smtClean="0">
+                <a:solidFill>
+                  <a:srgbClr val="0070C0"/>
+                </a:solidFill>
+              </a:rPr>
+              <a:t>Policies</a:t>
+            </a:r>
+          </a:p>
+          <a:p>
+            <a:pPr marL="285750" indent="-285750">
+              <a:buFontTx/>
+              <a:buChar char="-"/>
+            </a:pPr>
+            <a:endParaRPr lang="pl-PL" dirty="0">
+              <a:solidFill>
+                <a:srgbClr val="0070C0"/>
+              </a:solidFill>
+            </a:endParaRPr>
+          </a:p>
+          <a:p>
+            <a:pPr marL="285750" indent="-285750">
+              <a:buFontTx/>
+              <a:buChar char="-"/>
+            </a:pPr>
+            <a:endParaRPr lang="pl-PL" dirty="0" smtClean="0">
+              <a:solidFill>
+                <a:srgbClr val="0070C0"/>
+              </a:solidFill>
+            </a:endParaRPr>
+          </a:p>
+          <a:p>
+            <a:r>
+              <a:rPr lang="pl-PL" dirty="0" smtClean="0">
+                <a:solidFill>
+                  <a:srgbClr val="0070C0"/>
+                </a:solidFill>
+              </a:rPr>
+              <a:t>(too) many options for each type</a:t>
             </a:r>
             <a:endParaRPr lang="en-GB" dirty="0" err="1">
               <a:solidFill>
@@ -4926,6 +5100,13 @@
   <p:clrMapOvr>
     <a:masterClrMapping/>
   </p:clrMapOvr>
+  <p:timing>
+    <p:tnLst>
+      <p:par>
+        <p:cTn id="1" dur="indefinite" restart="never" nodeType="tmRoot"/>
+      </p:par>
+    </p:tnLst>
+  </p:timing>
 </p:sld>
 </file>
 
@@ -5002,7 +5183,7 @@
         <p:spPr>
           <a:xfrm>
             <a:off x="742384" y="2064189"/>
-            <a:ext cx="10981854" cy="4247317"/>
+            <a:ext cx="10981854" cy="646331"/>
           </a:xfrm>
           <a:prstGeom prst="rect">
             <a:avLst/>
@@ -5014,582 +5195,22 @@
           </a:bodyPr>
           <a:lstStyle/>
           <a:p>
+            <a:endParaRPr lang="pl-PL" dirty="0" err="1" smtClean="0"/>
+          </a:p>
+          <a:p>
             <a:r>
               <a:rPr lang="pl-PL" dirty="0" smtClean="0">
                 <a:solidFill>
                   <a:srgbClr val="0070C0"/>
                 </a:solidFill>
               </a:rPr>
-              <a:t>Who is behind it? What is its funding?</a:t>
-            </a:r>
-          </a:p>
-          <a:p>
-            <a:endParaRPr lang="pl-PL" dirty="0" smtClean="0">
+              <a:t>Excercise</a:t>
+            </a:r>
+            <a:endParaRPr lang="en-GB" dirty="0" err="1">
               <a:solidFill>
                 <a:srgbClr val="0070C0"/>
               </a:solidFill>
             </a:endParaRPr>
-          </a:p>
-          <a:p>
-            <a:r>
-              <a:rPr lang="pl-PL" dirty="0" smtClean="0">
-                <a:solidFill>
-                  <a:srgbClr val="0070C0"/>
-                </a:solidFill>
-              </a:rPr>
-              <a:t>Q</a:t>
-            </a:r>
-            <a:r>
-              <a:rPr lang="en-GB" dirty="0" err="1" smtClean="0">
-                <a:solidFill>
-                  <a:srgbClr val="0070C0"/>
-                </a:solidFill>
-              </a:rPr>
-              <a:t>uality</a:t>
-            </a:r>
-            <a:r>
-              <a:rPr lang="en-GB" dirty="0" smtClean="0">
-                <a:solidFill>
-                  <a:srgbClr val="0070C0"/>
-                </a:solidFill>
-              </a:rPr>
-              <a:t> </a:t>
-            </a:r>
-            <a:r>
-              <a:rPr lang="en-GB" dirty="0">
-                <a:solidFill>
-                  <a:srgbClr val="0070C0"/>
-                </a:solidFill>
-              </a:rPr>
-              <a:t>of </a:t>
-            </a:r>
-            <a:r>
-              <a:rPr lang="en-GB" dirty="0" smtClean="0">
-                <a:solidFill>
-                  <a:srgbClr val="0070C0"/>
-                </a:solidFill>
-              </a:rPr>
-              <a:t>interaction</a:t>
-            </a:r>
-            <a:r>
-              <a:rPr lang="pl-PL" dirty="0" smtClean="0">
-                <a:solidFill>
-                  <a:srgbClr val="0070C0"/>
-                </a:solidFill>
-              </a:rPr>
-              <a:t>/interface</a:t>
-            </a:r>
-            <a:r>
-              <a:rPr lang="en-GB" dirty="0" smtClean="0">
-                <a:solidFill>
-                  <a:srgbClr val="0070C0"/>
-                </a:solidFill>
-              </a:rPr>
-              <a:t>: </a:t>
-            </a:r>
-            <a:r>
-              <a:rPr lang="pl-PL" dirty="0" smtClean="0">
-                <a:solidFill>
-                  <a:srgbClr val="0070C0"/>
-                </a:solidFill>
-              </a:rPr>
-              <a:t/>
-            </a:r>
-            <a:br>
-              <a:rPr lang="pl-PL" dirty="0" smtClean="0">
-                <a:solidFill>
-                  <a:srgbClr val="0070C0"/>
-                </a:solidFill>
-              </a:rPr>
-            </a:br>
-            <a:r>
-              <a:rPr lang="pl-PL" dirty="0" smtClean="0">
-                <a:solidFill>
-                  <a:srgbClr val="0070C0"/>
-                </a:solidFill>
-              </a:rPr>
-              <a:t>	</a:t>
-            </a:r>
-            <a:r>
-              <a:rPr lang="en-GB" dirty="0" smtClean="0">
-                <a:solidFill>
-                  <a:srgbClr val="0070C0"/>
-                </a:solidFill>
-              </a:rPr>
-              <a:t>is </a:t>
-            </a:r>
-            <a:r>
-              <a:rPr lang="en-GB" dirty="0">
-                <a:solidFill>
-                  <a:srgbClr val="0070C0"/>
-                </a:solidFill>
-              </a:rPr>
-              <a:t>the interaction for purposes of data deposit or reuse efficient, effective and satisfactory for you?</a:t>
-            </a:r>
-          </a:p>
-          <a:p>
-            <a:endParaRPr lang="pl-PL" dirty="0" smtClean="0">
-              <a:solidFill>
-                <a:srgbClr val="0070C0"/>
-              </a:solidFill>
-            </a:endParaRPr>
-          </a:p>
-          <a:p>
-            <a:r>
-              <a:rPr lang="pl-PL" dirty="0" smtClean="0">
-                <a:solidFill>
-                  <a:srgbClr val="0070C0"/>
-                </a:solidFill>
-              </a:rPr>
-              <a:t>T</a:t>
-            </a:r>
-            <a:r>
-              <a:rPr lang="en-GB" dirty="0" err="1" smtClean="0">
-                <a:solidFill>
-                  <a:srgbClr val="0070C0"/>
-                </a:solidFill>
-              </a:rPr>
-              <a:t>ake</a:t>
-            </a:r>
-            <a:r>
-              <a:rPr lang="en-GB" dirty="0" smtClean="0">
-                <a:solidFill>
-                  <a:srgbClr val="0070C0"/>
-                </a:solidFill>
-              </a:rPr>
-              <a:t>-up </a:t>
-            </a:r>
-            <a:r>
-              <a:rPr lang="en-GB" dirty="0">
-                <a:solidFill>
-                  <a:srgbClr val="0070C0"/>
-                </a:solidFill>
-              </a:rPr>
-              <a:t>and impact: </a:t>
-            </a:r>
-            <a:endParaRPr lang="pl-PL" dirty="0" smtClean="0">
-              <a:solidFill>
-                <a:srgbClr val="0070C0"/>
-              </a:solidFill>
-            </a:endParaRPr>
-          </a:p>
-          <a:p>
-            <a:r>
-              <a:rPr lang="pl-PL" dirty="0">
-                <a:solidFill>
-                  <a:srgbClr val="0070C0"/>
-                </a:solidFill>
-              </a:rPr>
-              <a:t>	</a:t>
-            </a:r>
-            <a:r>
-              <a:rPr lang="en-GB" dirty="0" smtClean="0">
-                <a:solidFill>
-                  <a:srgbClr val="0070C0"/>
-                </a:solidFill>
-              </a:rPr>
-              <a:t>what </a:t>
-            </a:r>
-            <a:r>
-              <a:rPr lang="en-GB" dirty="0">
-                <a:solidFill>
-                  <a:srgbClr val="0070C0"/>
-                </a:solidFill>
-              </a:rPr>
-              <a:t>can I put in it? </a:t>
-            </a:r>
-            <a:r>
-              <a:rPr lang="pl-PL" dirty="0">
-                <a:solidFill>
-                  <a:srgbClr val="0070C0"/>
-                </a:solidFill>
-              </a:rPr>
-              <a:t/>
-            </a:r>
-            <a:br>
-              <a:rPr lang="pl-PL" dirty="0">
-                <a:solidFill>
-                  <a:srgbClr val="0070C0"/>
-                </a:solidFill>
-              </a:rPr>
-            </a:br>
-            <a:r>
-              <a:rPr lang="pl-PL" dirty="0" smtClean="0">
-                <a:solidFill>
-                  <a:srgbClr val="0070C0"/>
-                </a:solidFill>
-              </a:rPr>
-              <a:t>	i</a:t>
-            </a:r>
-            <a:r>
-              <a:rPr lang="en-GB" dirty="0" smtClean="0">
-                <a:solidFill>
-                  <a:srgbClr val="0070C0"/>
-                </a:solidFill>
-              </a:rPr>
-              <a:t>s </a:t>
-            </a:r>
-            <a:r>
-              <a:rPr lang="en-GB" dirty="0">
-                <a:solidFill>
-                  <a:srgbClr val="0070C0"/>
-                </a:solidFill>
-              </a:rPr>
-              <a:t>anyone else using it? </a:t>
-            </a:r>
-            <a:r>
-              <a:rPr lang="pl-PL" dirty="0">
-                <a:solidFill>
-                  <a:srgbClr val="0070C0"/>
-                </a:solidFill>
-              </a:rPr>
-              <a:t/>
-            </a:r>
-            <a:br>
-              <a:rPr lang="pl-PL" dirty="0">
-                <a:solidFill>
-                  <a:srgbClr val="0070C0"/>
-                </a:solidFill>
-              </a:rPr>
-            </a:br>
-            <a:r>
-              <a:rPr lang="pl-PL" dirty="0" smtClean="0">
-                <a:solidFill>
-                  <a:srgbClr val="0070C0"/>
-                </a:solidFill>
-              </a:rPr>
-              <a:t>	w</a:t>
-            </a:r>
-            <a:r>
-              <a:rPr lang="en-GB" dirty="0" smtClean="0">
-                <a:solidFill>
-                  <a:srgbClr val="0070C0"/>
-                </a:solidFill>
-              </a:rPr>
-              <a:t>ill </a:t>
-            </a:r>
-            <a:r>
-              <a:rPr lang="en-GB" dirty="0">
-                <a:solidFill>
-                  <a:srgbClr val="0070C0"/>
-                </a:solidFill>
-              </a:rPr>
-              <a:t>others be able to find stuff deposited in </a:t>
-            </a:r>
-            <a:r>
-              <a:rPr lang="en-GB" dirty="0" smtClean="0">
-                <a:solidFill>
-                  <a:srgbClr val="0070C0"/>
-                </a:solidFill>
-              </a:rPr>
-              <a:t>it?</a:t>
-            </a:r>
-            <a:r>
-              <a:rPr lang="pl-PL" dirty="0" smtClean="0">
-                <a:solidFill>
-                  <a:srgbClr val="0070C0"/>
-                </a:solidFill>
-              </a:rPr>
-              <a:t/>
-            </a:r>
-            <a:br>
-              <a:rPr lang="pl-PL" dirty="0" smtClean="0">
-                <a:solidFill>
-                  <a:srgbClr val="0070C0"/>
-                </a:solidFill>
-              </a:rPr>
-            </a:br>
-            <a:r>
-              <a:rPr lang="pl-PL" dirty="0" smtClean="0">
-                <a:solidFill>
-                  <a:srgbClr val="0070C0"/>
-                </a:solidFill>
-              </a:rPr>
-              <a:t>	is</a:t>
-            </a:r>
-            <a:r>
-              <a:rPr lang="en-GB" dirty="0" smtClean="0">
-                <a:solidFill>
-                  <a:srgbClr val="0070C0"/>
-                </a:solidFill>
-              </a:rPr>
-              <a:t> </a:t>
-            </a:r>
-            <a:r>
-              <a:rPr lang="en-GB" dirty="0">
-                <a:solidFill>
-                  <a:srgbClr val="0070C0"/>
-                </a:solidFill>
-              </a:rPr>
-              <a:t>the repository linked to other data </a:t>
-            </a:r>
-            <a:r>
-              <a:rPr lang="en-GB" dirty="0" smtClean="0">
-                <a:solidFill>
-                  <a:srgbClr val="0070C0"/>
-                </a:solidFill>
-              </a:rPr>
-              <a:t>repositories</a:t>
-            </a:r>
-            <a:r>
-              <a:rPr lang="pl-PL" dirty="0" smtClean="0">
-                <a:solidFill>
-                  <a:srgbClr val="0070C0"/>
-                </a:solidFill>
-              </a:rPr>
-              <a:t>?</a:t>
-            </a:r>
-            <a:br>
-              <a:rPr lang="pl-PL" dirty="0" smtClean="0">
-                <a:solidFill>
-                  <a:srgbClr val="0070C0"/>
-                </a:solidFill>
-              </a:rPr>
-            </a:br>
-            <a:r>
-              <a:rPr lang="pl-PL" dirty="0" smtClean="0">
-                <a:solidFill>
-                  <a:srgbClr val="0070C0"/>
-                </a:solidFill>
-              </a:rPr>
-              <a:t>	</a:t>
-            </a:r>
-            <a:r>
-              <a:rPr lang="pl-PL" dirty="0">
-                <a:solidFill>
-                  <a:srgbClr val="0070C0"/>
-                </a:solidFill>
-              </a:rPr>
-              <a:t>c</a:t>
-            </a:r>
-            <a:r>
-              <a:rPr lang="en-GB" dirty="0" smtClean="0">
-                <a:solidFill>
-                  <a:srgbClr val="0070C0"/>
-                </a:solidFill>
-              </a:rPr>
-              <a:t>an </a:t>
-            </a:r>
-            <a:r>
-              <a:rPr lang="en-GB" dirty="0">
-                <a:solidFill>
-                  <a:srgbClr val="0070C0"/>
-                </a:solidFill>
-              </a:rPr>
-              <a:t>others cite the </a:t>
-            </a:r>
-            <a:r>
-              <a:rPr lang="en-GB" dirty="0" smtClean="0">
-                <a:solidFill>
-                  <a:srgbClr val="0070C0"/>
-                </a:solidFill>
-              </a:rPr>
-              <a:t>data?</a:t>
-            </a:r>
-            <a:endParaRPr lang="pl-PL" dirty="0" smtClean="0">
-              <a:solidFill>
-                <a:srgbClr val="0070C0"/>
-              </a:solidFill>
-            </a:endParaRPr>
-          </a:p>
-          <a:p>
-            <a:endParaRPr lang="en-GB" dirty="0">
-              <a:solidFill>
-                <a:srgbClr val="0070C0"/>
-              </a:solidFill>
-            </a:endParaRPr>
-          </a:p>
-          <a:p>
-            <a:r>
-              <a:rPr lang="pl-PL" dirty="0" smtClean="0">
-                <a:solidFill>
-                  <a:srgbClr val="0070C0"/>
-                </a:solidFill>
-              </a:rPr>
-              <a:t>P</a:t>
-            </a:r>
-            <a:r>
-              <a:rPr lang="en-GB" dirty="0" err="1" smtClean="0">
-                <a:solidFill>
-                  <a:srgbClr val="0070C0"/>
-                </a:solidFill>
-              </a:rPr>
-              <a:t>olicy</a:t>
-            </a:r>
-            <a:r>
-              <a:rPr lang="en-GB" dirty="0" smtClean="0">
-                <a:solidFill>
-                  <a:srgbClr val="0070C0"/>
-                </a:solidFill>
-              </a:rPr>
-              <a:t> </a:t>
-            </a:r>
-            <a:r>
-              <a:rPr lang="en-GB" dirty="0">
-                <a:solidFill>
-                  <a:srgbClr val="0070C0"/>
-                </a:solidFill>
-              </a:rPr>
-              <a:t>and process: </a:t>
-            </a:r>
-            <a:r>
-              <a:rPr lang="pl-PL" dirty="0" smtClean="0">
-                <a:solidFill>
-                  <a:srgbClr val="0070C0"/>
-                </a:solidFill>
-              </a:rPr>
-              <a:t/>
-            </a:r>
-            <a:br>
-              <a:rPr lang="pl-PL" dirty="0" smtClean="0">
-                <a:solidFill>
-                  <a:srgbClr val="0070C0"/>
-                </a:solidFill>
-              </a:rPr>
-            </a:br>
-            <a:r>
-              <a:rPr lang="pl-PL" dirty="0" smtClean="0">
-                <a:solidFill>
-                  <a:srgbClr val="0070C0"/>
-                </a:solidFill>
-              </a:rPr>
-              <a:t>	d</a:t>
-            </a:r>
-            <a:r>
-              <a:rPr lang="en-GB" dirty="0" err="1" smtClean="0">
-                <a:solidFill>
-                  <a:srgbClr val="0070C0"/>
-                </a:solidFill>
-              </a:rPr>
-              <a:t>oes</a:t>
-            </a:r>
-            <a:r>
-              <a:rPr lang="en-GB" dirty="0" smtClean="0">
-                <a:solidFill>
-                  <a:srgbClr val="0070C0"/>
-                </a:solidFill>
-              </a:rPr>
-              <a:t> </a:t>
-            </a:r>
-            <a:r>
-              <a:rPr lang="en-GB" dirty="0">
-                <a:solidFill>
-                  <a:srgbClr val="0070C0"/>
-                </a:solidFill>
-              </a:rPr>
-              <a:t>it help </a:t>
-            </a:r>
-            <a:r>
-              <a:rPr lang="en-GB" dirty="0" smtClean="0">
-                <a:solidFill>
-                  <a:srgbClr val="0070C0"/>
-                </a:solidFill>
-              </a:rPr>
-              <a:t>meet</a:t>
-            </a:r>
-            <a:r>
-              <a:rPr lang="pl-PL" dirty="0" smtClean="0">
-                <a:solidFill>
-                  <a:srgbClr val="0070C0"/>
-                </a:solidFill>
-              </a:rPr>
-              <a:t>ing</a:t>
-            </a:r>
-            <a:r>
-              <a:rPr lang="en-GB" dirty="0" smtClean="0">
-                <a:solidFill>
-                  <a:srgbClr val="0070C0"/>
-                </a:solidFill>
-              </a:rPr>
-              <a:t> </a:t>
-            </a:r>
-            <a:r>
-              <a:rPr lang="en-GB" dirty="0">
-                <a:solidFill>
-                  <a:srgbClr val="0070C0"/>
-                </a:solidFill>
-              </a:rPr>
-              <a:t>community </a:t>
-            </a:r>
-            <a:r>
-              <a:rPr lang="en-GB" dirty="0" smtClean="0">
-                <a:solidFill>
-                  <a:srgbClr val="0070C0"/>
-                </a:solidFill>
-              </a:rPr>
-              <a:t>standards</a:t>
-            </a:r>
-            <a:r>
-              <a:rPr lang="pl-PL" dirty="0" smtClean="0">
-                <a:solidFill>
-                  <a:srgbClr val="0070C0"/>
-                </a:solidFill>
-              </a:rPr>
-              <a:t>,</a:t>
-            </a:r>
-            <a:r>
-              <a:rPr lang="en-GB" dirty="0" smtClean="0">
-                <a:solidFill>
-                  <a:srgbClr val="0070C0"/>
-                </a:solidFill>
-              </a:rPr>
-              <a:t> good practice</a:t>
-            </a:r>
-            <a:r>
-              <a:rPr lang="pl-PL" dirty="0" smtClean="0">
-                <a:solidFill>
-                  <a:srgbClr val="0070C0"/>
-                </a:solidFill>
-              </a:rPr>
-              <a:t>s</a:t>
-            </a:r>
-            <a:r>
-              <a:rPr lang="en-GB" dirty="0" smtClean="0">
-                <a:solidFill>
-                  <a:srgbClr val="0070C0"/>
-                </a:solidFill>
-              </a:rPr>
-              <a:t> </a:t>
-            </a:r>
-            <a:r>
-              <a:rPr lang="pl-PL" dirty="0" smtClean="0">
-                <a:solidFill>
-                  <a:srgbClr val="0070C0"/>
-                </a:solidFill>
-              </a:rPr>
-              <a:t>and</a:t>
-            </a:r>
-            <a:r>
-              <a:rPr lang="en-GB" dirty="0" smtClean="0">
-                <a:solidFill>
-                  <a:srgbClr val="0070C0"/>
-                </a:solidFill>
-              </a:rPr>
-              <a:t> policies</a:t>
-            </a:r>
-            <a:r>
-              <a:rPr lang="pl-PL" dirty="0" smtClean="0">
-                <a:solidFill>
-                  <a:srgbClr val="0070C0"/>
-                </a:solidFill>
-              </a:rPr>
-              <a:t>?</a:t>
-            </a:r>
-            <a:br>
-              <a:rPr lang="pl-PL" dirty="0" smtClean="0">
-                <a:solidFill>
-                  <a:srgbClr val="0070C0"/>
-                </a:solidFill>
-              </a:rPr>
-            </a:br>
-            <a:r>
-              <a:rPr lang="pl-PL" dirty="0" smtClean="0">
-                <a:solidFill>
-                  <a:srgbClr val="0070C0"/>
-                </a:solidFill>
-              </a:rPr>
-              <a:t>	is it curated</a:t>
-            </a:r>
           </a:p>
         </p:txBody>
       </p:sp>
@@ -5620,42 +5241,38 @@
           <a:lstStyle/>
           <a:p>
             <a:r>
-              <a:rPr lang="en-GB" b="1" dirty="0">
-                <a:solidFill>
-                  <a:srgbClr val="0070C0"/>
-                </a:solidFill>
-              </a:rPr>
-              <a:t>Evaluating a </a:t>
-            </a:r>
-            <a:r>
-              <a:rPr lang="en-GB" b="1" dirty="0" smtClean="0">
-                <a:solidFill>
-                  <a:srgbClr val="0070C0"/>
-                </a:solidFill>
-              </a:rPr>
-              <a:t>data </a:t>
-            </a:r>
-            <a:r>
-              <a:rPr lang="en-GB" b="1" dirty="0">
-                <a:solidFill>
-                  <a:srgbClr val="0070C0"/>
-                </a:solidFill>
-              </a:rPr>
-              <a:t>repository</a:t>
-            </a:r>
+              <a:rPr lang="pl-PL" dirty="0" smtClean="0">
+                <a:solidFill>
+                  <a:srgbClr val="0070C0"/>
+                </a:solidFill>
+              </a:rPr>
+              <a:t>Finding repository</a:t>
+            </a:r>
+            <a:endParaRPr lang="en-GB" dirty="0">
+              <a:solidFill>
+                <a:srgbClr val="0070C0"/>
+              </a:solidFill>
+            </a:endParaRPr>
           </a:p>
         </p:txBody>
       </p:sp>
     </p:spTree>
     <p:extLst>
       <p:ext uri="{BB962C8B-B14F-4D97-AF65-F5344CB8AC3E}">
-        <p14:creationId xmlns:p14="http://schemas.microsoft.com/office/powerpoint/2010/main" val="2410312540"/>
+        <p14:creationId xmlns:p14="http://schemas.microsoft.com/office/powerpoint/2010/main" val="213822311"/>
       </p:ext>
     </p:extLst>
   </p:cSld>
   <p:clrMapOvr>
     <a:masterClrMapping/>
   </p:clrMapOvr>
+  <p:timing>
+    <p:tnLst>
+      <p:par>
+        <p:cTn id="1" dur="indefinite" restart="never" nodeType="tmRoot"/>
+      </p:par>
+    </p:tnLst>
+  </p:timing>
 </p:sld>
 </file>
 
@@ -5732,7 +5349,7 @@
         <p:spPr>
           <a:xfrm>
             <a:off x="742384" y="2064189"/>
-            <a:ext cx="10981854" cy="2031325"/>
+            <a:ext cx="10981854" cy="4247317"/>
           </a:xfrm>
           <a:prstGeom prst="rect">
             <a:avLst/>
@@ -5744,41 +5361,16 @@
           </a:bodyPr>
           <a:lstStyle/>
           <a:p>
-            <a:endParaRPr lang="pl-PL" dirty="0" err="1" smtClean="0"/>
-          </a:p>
-          <a:p>
-            <a:r>
-              <a:rPr lang="en-GB" dirty="0">
-                <a:solidFill>
-                  <a:srgbClr val="0070C0"/>
-                </a:solidFill>
-              </a:rPr>
-              <a:t>Why is choosing a domain specific repositories over </a:t>
-            </a:r>
-            <a:r>
-              <a:rPr lang="en-GB" dirty="0" err="1">
-                <a:solidFill>
-                  <a:srgbClr val="0070C0"/>
-                </a:solidFill>
-              </a:rPr>
-              <a:t>zenodo</a:t>
-            </a:r>
-            <a:r>
-              <a:rPr lang="en-GB" dirty="0">
-                <a:solidFill>
-                  <a:srgbClr val="0070C0"/>
-                </a:solidFill>
-              </a:rPr>
-              <a:t> more FAIR</a:t>
-            </a:r>
-            <a:r>
-              <a:rPr lang="en-GB" dirty="0" smtClean="0">
-                <a:solidFill>
-                  <a:srgbClr val="0070C0"/>
-                </a:solidFill>
-              </a:rPr>
-              <a:t>?</a:t>
-            </a:r>
+            <a:r>
+              <a:rPr lang="pl-PL" dirty="0" smtClean="0">
+                <a:solidFill>
+                  <a:srgbClr val="0070C0"/>
+                </a:solidFill>
+              </a:rPr>
+              <a:t>Who is behind it? What is its funding?</a:t>
+            </a:r>
+          </a:p>
+          <a:p>
             <a:endParaRPr lang="pl-PL" dirty="0" smtClean="0">
               <a:solidFill>
                 <a:srgbClr val="0070C0"/>
@@ -5786,6 +5378,368 @@
             </a:endParaRPr>
           </a:p>
           <a:p>
+            <a:r>
+              <a:rPr lang="pl-PL" dirty="0" smtClean="0">
+                <a:solidFill>
+                  <a:srgbClr val="0070C0"/>
+                </a:solidFill>
+              </a:rPr>
+              <a:t>Q</a:t>
+            </a:r>
+            <a:r>
+              <a:rPr lang="en-GB" dirty="0" err="1" smtClean="0">
+                <a:solidFill>
+                  <a:srgbClr val="0070C0"/>
+                </a:solidFill>
+              </a:rPr>
+              <a:t>uality</a:t>
+            </a:r>
+            <a:r>
+              <a:rPr lang="en-GB" dirty="0" smtClean="0">
+                <a:solidFill>
+                  <a:srgbClr val="0070C0"/>
+                </a:solidFill>
+              </a:rPr>
+              <a:t> </a:t>
+            </a:r>
+            <a:r>
+              <a:rPr lang="en-GB" dirty="0">
+                <a:solidFill>
+                  <a:srgbClr val="0070C0"/>
+                </a:solidFill>
+              </a:rPr>
+              <a:t>of </a:t>
+            </a:r>
+            <a:r>
+              <a:rPr lang="en-GB" dirty="0" smtClean="0">
+                <a:solidFill>
+                  <a:srgbClr val="0070C0"/>
+                </a:solidFill>
+              </a:rPr>
+              <a:t>interaction</a:t>
+            </a:r>
+            <a:r>
+              <a:rPr lang="pl-PL" dirty="0" smtClean="0">
+                <a:solidFill>
+                  <a:srgbClr val="0070C0"/>
+                </a:solidFill>
+              </a:rPr>
+              <a:t>/interface</a:t>
+            </a:r>
+            <a:r>
+              <a:rPr lang="en-GB" dirty="0" smtClean="0">
+                <a:solidFill>
+                  <a:srgbClr val="0070C0"/>
+                </a:solidFill>
+              </a:rPr>
+              <a:t>: </a:t>
+            </a:r>
+            <a:r>
+              <a:rPr lang="pl-PL" dirty="0" smtClean="0">
+                <a:solidFill>
+                  <a:srgbClr val="0070C0"/>
+                </a:solidFill>
+              </a:rPr>
+              <a:t/>
+            </a:r>
+            <a:br>
+              <a:rPr lang="pl-PL" dirty="0" smtClean="0">
+                <a:solidFill>
+                  <a:srgbClr val="0070C0"/>
+                </a:solidFill>
+              </a:rPr>
+            </a:br>
+            <a:r>
+              <a:rPr lang="pl-PL" dirty="0" smtClean="0">
+                <a:solidFill>
+                  <a:srgbClr val="0070C0"/>
+                </a:solidFill>
+              </a:rPr>
+              <a:t>	</a:t>
+            </a:r>
+            <a:r>
+              <a:rPr lang="en-GB" dirty="0" smtClean="0">
+                <a:solidFill>
+                  <a:srgbClr val="0070C0"/>
+                </a:solidFill>
+              </a:rPr>
+              <a:t>is </a:t>
+            </a:r>
+            <a:r>
+              <a:rPr lang="en-GB" dirty="0">
+                <a:solidFill>
+                  <a:srgbClr val="0070C0"/>
+                </a:solidFill>
+              </a:rPr>
+              <a:t>the interaction for purposes of data deposit or reuse efficient, effective and satisfactory for you?</a:t>
+            </a:r>
+          </a:p>
+          <a:p>
+            <a:endParaRPr lang="pl-PL" dirty="0" smtClean="0">
+              <a:solidFill>
+                <a:srgbClr val="0070C0"/>
+              </a:solidFill>
+            </a:endParaRPr>
+          </a:p>
+          <a:p>
+            <a:r>
+              <a:rPr lang="pl-PL" dirty="0" smtClean="0">
+                <a:solidFill>
+                  <a:srgbClr val="0070C0"/>
+                </a:solidFill>
+              </a:rPr>
+              <a:t>T</a:t>
+            </a:r>
+            <a:r>
+              <a:rPr lang="en-GB" dirty="0" err="1" smtClean="0">
+                <a:solidFill>
+                  <a:srgbClr val="0070C0"/>
+                </a:solidFill>
+              </a:rPr>
+              <a:t>ake</a:t>
+            </a:r>
+            <a:r>
+              <a:rPr lang="en-GB" dirty="0" smtClean="0">
+                <a:solidFill>
+                  <a:srgbClr val="0070C0"/>
+                </a:solidFill>
+              </a:rPr>
+              <a:t>-up </a:t>
+            </a:r>
+            <a:r>
+              <a:rPr lang="en-GB" dirty="0">
+                <a:solidFill>
+                  <a:srgbClr val="0070C0"/>
+                </a:solidFill>
+              </a:rPr>
+              <a:t>and impact: </a:t>
+            </a:r>
+            <a:endParaRPr lang="pl-PL" dirty="0" smtClean="0">
+              <a:solidFill>
+                <a:srgbClr val="0070C0"/>
+              </a:solidFill>
+            </a:endParaRPr>
+          </a:p>
+          <a:p>
+            <a:r>
+              <a:rPr lang="pl-PL" dirty="0">
+                <a:solidFill>
+                  <a:srgbClr val="0070C0"/>
+                </a:solidFill>
+              </a:rPr>
+              <a:t>	</a:t>
+            </a:r>
+            <a:r>
+              <a:rPr lang="en-GB" dirty="0" smtClean="0">
+                <a:solidFill>
+                  <a:srgbClr val="0070C0"/>
+                </a:solidFill>
+              </a:rPr>
+              <a:t>what </a:t>
+            </a:r>
+            <a:r>
+              <a:rPr lang="en-GB" dirty="0">
+                <a:solidFill>
+                  <a:srgbClr val="0070C0"/>
+                </a:solidFill>
+              </a:rPr>
+              <a:t>can I put in it? </a:t>
+            </a:r>
+            <a:r>
+              <a:rPr lang="pl-PL" dirty="0">
+                <a:solidFill>
+                  <a:srgbClr val="0070C0"/>
+                </a:solidFill>
+              </a:rPr>
+              <a:t/>
+            </a:r>
+            <a:br>
+              <a:rPr lang="pl-PL" dirty="0">
+                <a:solidFill>
+                  <a:srgbClr val="0070C0"/>
+                </a:solidFill>
+              </a:rPr>
+            </a:br>
+            <a:r>
+              <a:rPr lang="pl-PL" dirty="0" smtClean="0">
+                <a:solidFill>
+                  <a:srgbClr val="0070C0"/>
+                </a:solidFill>
+              </a:rPr>
+              <a:t>	i</a:t>
+            </a:r>
+            <a:r>
+              <a:rPr lang="en-GB" dirty="0" smtClean="0">
+                <a:solidFill>
+                  <a:srgbClr val="0070C0"/>
+                </a:solidFill>
+              </a:rPr>
+              <a:t>s </a:t>
+            </a:r>
+            <a:r>
+              <a:rPr lang="en-GB" dirty="0">
+                <a:solidFill>
+                  <a:srgbClr val="0070C0"/>
+                </a:solidFill>
+              </a:rPr>
+              <a:t>anyone else using it? </a:t>
+            </a:r>
+            <a:r>
+              <a:rPr lang="pl-PL" dirty="0">
+                <a:solidFill>
+                  <a:srgbClr val="0070C0"/>
+                </a:solidFill>
+              </a:rPr>
+              <a:t/>
+            </a:r>
+            <a:br>
+              <a:rPr lang="pl-PL" dirty="0">
+                <a:solidFill>
+                  <a:srgbClr val="0070C0"/>
+                </a:solidFill>
+              </a:rPr>
+            </a:br>
+            <a:r>
+              <a:rPr lang="pl-PL" dirty="0" smtClean="0">
+                <a:solidFill>
+                  <a:srgbClr val="0070C0"/>
+                </a:solidFill>
+              </a:rPr>
+              <a:t>	w</a:t>
+            </a:r>
+            <a:r>
+              <a:rPr lang="en-GB" dirty="0" smtClean="0">
+                <a:solidFill>
+                  <a:srgbClr val="0070C0"/>
+                </a:solidFill>
+              </a:rPr>
+              <a:t>ill </a:t>
+            </a:r>
+            <a:r>
+              <a:rPr lang="en-GB" dirty="0">
+                <a:solidFill>
+                  <a:srgbClr val="0070C0"/>
+                </a:solidFill>
+              </a:rPr>
+              <a:t>others be able to find stuff deposited in </a:t>
+            </a:r>
+            <a:r>
+              <a:rPr lang="en-GB" dirty="0" smtClean="0">
+                <a:solidFill>
+                  <a:srgbClr val="0070C0"/>
+                </a:solidFill>
+              </a:rPr>
+              <a:t>it?</a:t>
+            </a:r>
+            <a:r>
+              <a:rPr lang="pl-PL" dirty="0" smtClean="0">
+                <a:solidFill>
+                  <a:srgbClr val="0070C0"/>
+                </a:solidFill>
+              </a:rPr>
+              <a:t/>
+            </a:r>
+            <a:br>
+              <a:rPr lang="pl-PL" dirty="0" smtClean="0">
+                <a:solidFill>
+                  <a:srgbClr val="0070C0"/>
+                </a:solidFill>
+              </a:rPr>
+            </a:br>
+            <a:r>
+              <a:rPr lang="pl-PL" dirty="0" smtClean="0">
+                <a:solidFill>
+                  <a:srgbClr val="0070C0"/>
+                </a:solidFill>
+              </a:rPr>
+              <a:t>	is</a:t>
+            </a:r>
+            <a:r>
+              <a:rPr lang="en-GB" dirty="0" smtClean="0">
+                <a:solidFill>
+                  <a:srgbClr val="0070C0"/>
+                </a:solidFill>
+              </a:rPr>
+              <a:t> </a:t>
+            </a:r>
+            <a:r>
+              <a:rPr lang="en-GB" dirty="0">
+                <a:solidFill>
+                  <a:srgbClr val="0070C0"/>
+                </a:solidFill>
+              </a:rPr>
+              <a:t>the repository linked to other data </a:t>
+            </a:r>
+            <a:r>
+              <a:rPr lang="en-GB" dirty="0" smtClean="0">
+                <a:solidFill>
+                  <a:srgbClr val="0070C0"/>
+                </a:solidFill>
+              </a:rPr>
+              <a:t>repositories</a:t>
+            </a:r>
+            <a:r>
+              <a:rPr lang="pl-PL" dirty="0" smtClean="0">
+                <a:solidFill>
+                  <a:srgbClr val="0070C0"/>
+                </a:solidFill>
+              </a:rPr>
+              <a:t>?</a:t>
+            </a:r>
+            <a:br>
+              <a:rPr lang="pl-PL" dirty="0" smtClean="0">
+                <a:solidFill>
+                  <a:srgbClr val="0070C0"/>
+                </a:solidFill>
+              </a:rPr>
+            </a:br>
+            <a:r>
+              <a:rPr lang="pl-PL" dirty="0" smtClean="0">
+                <a:solidFill>
+                  <a:srgbClr val="0070C0"/>
+                </a:solidFill>
+              </a:rPr>
+              <a:t>	</a:t>
+            </a:r>
+            <a:r>
+              <a:rPr lang="pl-PL" dirty="0">
+                <a:solidFill>
+                  <a:srgbClr val="0070C0"/>
+                </a:solidFill>
+              </a:rPr>
+              <a:t>c</a:t>
+            </a:r>
+            <a:r>
+              <a:rPr lang="en-GB" dirty="0" smtClean="0">
+                <a:solidFill>
+                  <a:srgbClr val="0070C0"/>
+                </a:solidFill>
+              </a:rPr>
+              <a:t>an </a:t>
+            </a:r>
+            <a:r>
+              <a:rPr lang="en-GB" dirty="0">
+                <a:solidFill>
+                  <a:srgbClr val="0070C0"/>
+                </a:solidFill>
+              </a:rPr>
+              <a:t>others cite the </a:t>
+            </a:r>
+            <a:r>
+              <a:rPr lang="en-GB" dirty="0" smtClean="0">
+                <a:solidFill>
+                  <a:srgbClr val="0070C0"/>
+                </a:solidFill>
+              </a:rPr>
+              <a:t>data?</a:t>
+            </a:r>
+            <a:endParaRPr lang="pl-PL" dirty="0" smtClean="0">
+              <a:solidFill>
+                <a:srgbClr val="0070C0"/>
+              </a:solidFill>
+            </a:endParaRPr>
+          </a:p>
+          <a:p>
             <a:endParaRPr lang="en-GB" dirty="0">
               <a:solidFill>
                 <a:srgbClr val="0070C0"/>
@@ -5794,12 +5748,67 @@
           </a:p>
           <a:p>
             <a:r>
+              <a:rPr lang="pl-PL" dirty="0" smtClean="0">
+                <a:solidFill>
+                  <a:srgbClr val="0070C0"/>
+                </a:solidFill>
+              </a:rPr>
+              <a:t>P</a:t>
+            </a:r>
+            <a:r>
+              <a:rPr lang="en-GB" dirty="0" err="1" smtClean="0">
+                <a:solidFill>
+                  <a:srgbClr val="0070C0"/>
+                </a:solidFill>
+              </a:rPr>
+              <a:t>olicy</a:t>
+            </a:r>
+            <a:r>
+              <a:rPr lang="en-GB" dirty="0" smtClean="0">
+                <a:solidFill>
+                  <a:srgbClr val="0070C0"/>
+                </a:solidFill>
+              </a:rPr>
+              <a:t> </a:t>
+            </a:r>
+            <a:r>
               <a:rPr lang="en-GB" dirty="0">
                 <a:solidFill>
                   <a:srgbClr val="0070C0"/>
                 </a:solidFill>
               </a:rPr>
-              <a:t>How can selecting a repository for your data as soon as you do an experiment (or even before!) can benefit you research and help your data become FAIR</a:t>
+              <a:t>and process: </a:t>
+            </a:r>
+            <a:r>
+              <a:rPr lang="pl-PL" dirty="0" smtClean="0">
+                <a:solidFill>
+                  <a:srgbClr val="0070C0"/>
+                </a:solidFill>
+              </a:rPr>
+              <a:t/>
+            </a:r>
+            <a:br>
+              <a:rPr lang="pl-PL" dirty="0" smtClean="0">
+                <a:solidFill>
+                  <a:srgbClr val="0070C0"/>
+                </a:solidFill>
+              </a:rPr>
+            </a:br>
+            <a:r>
+              <a:rPr lang="pl-PL" dirty="0" smtClean="0">
+                <a:solidFill>
+                  <a:srgbClr val="0070C0"/>
+                </a:solidFill>
+              </a:rPr>
+              <a:t>	d</a:t>
+            </a:r>
+            <a:r>
+              <a:rPr lang="en-GB" dirty="0" err="1" smtClean="0">
+                <a:solidFill>
+                  <a:srgbClr val="0070C0"/>
+                </a:solidFill>
+              </a:rPr>
+              <a:t>oes</a:t>
             </a:r>
             <a:r>
               <a:rPr lang="en-GB" dirty="0" smtClean="0">
@@ -5807,29 +5816,126 @@
                   <a:srgbClr val="0070C0"/>
                 </a:solidFill>
               </a:rPr>
+              <a:t> </a:t>
+            </a:r>
+            <a:r>
+              <a:rPr lang="en-GB" dirty="0">
+                <a:solidFill>
+                  <a:srgbClr val="0070C0"/>
+                </a:solidFill>
+              </a:rPr>
+              <a:t>it help </a:t>
+            </a:r>
+            <a:r>
+              <a:rPr lang="en-GB" dirty="0" smtClean="0">
+                <a:solidFill>
+                  <a:srgbClr val="0070C0"/>
+                </a:solidFill>
+              </a:rPr>
+              <a:t>meet</a:t>
+            </a:r>
+            <a:r>
+              <a:rPr lang="pl-PL" dirty="0" smtClean="0">
+                <a:solidFill>
+                  <a:srgbClr val="0070C0"/>
+                </a:solidFill>
+              </a:rPr>
+              <a:t>ing</a:t>
+            </a:r>
+            <a:r>
+              <a:rPr lang="en-GB" dirty="0" smtClean="0">
+                <a:solidFill>
+                  <a:srgbClr val="0070C0"/>
+                </a:solidFill>
+              </a:rPr>
+              <a:t> </a:t>
+            </a:r>
+            <a:r>
+              <a:rPr lang="en-GB" dirty="0">
+                <a:solidFill>
+                  <a:srgbClr val="0070C0"/>
+                </a:solidFill>
+              </a:rPr>
+              <a:t>community </a:t>
+            </a:r>
+            <a:r>
+              <a:rPr lang="en-GB" dirty="0" smtClean="0">
+                <a:solidFill>
+                  <a:srgbClr val="0070C0"/>
+                </a:solidFill>
+              </a:rPr>
+              <a:t>standards</a:t>
+            </a:r>
+            <a:r>
+              <a:rPr lang="pl-PL" dirty="0" smtClean="0">
+                <a:solidFill>
+                  <a:srgbClr val="0070C0"/>
+                </a:solidFill>
+              </a:rPr>
+              <a:t>,</a:t>
+            </a:r>
+            <a:r>
+              <a:rPr lang="en-GB" dirty="0" smtClean="0">
+                <a:solidFill>
+                  <a:srgbClr val="0070C0"/>
+                </a:solidFill>
+              </a:rPr>
+              <a:t> good practice</a:t>
+            </a:r>
+            <a:r>
+              <a:rPr lang="pl-PL" dirty="0" smtClean="0">
+                <a:solidFill>
+                  <a:srgbClr val="0070C0"/>
+                </a:solidFill>
+              </a:rPr>
+              <a:t>s</a:t>
+            </a:r>
+            <a:r>
+              <a:rPr lang="en-GB" dirty="0" smtClean="0">
+                <a:solidFill>
+                  <a:srgbClr val="0070C0"/>
+                </a:solidFill>
+              </a:rPr>
+              <a:t> </a:t>
+            </a:r>
+            <a:r>
+              <a:rPr lang="pl-PL" dirty="0" smtClean="0">
+                <a:solidFill>
+                  <a:srgbClr val="0070C0"/>
+                </a:solidFill>
+              </a:rPr>
+              <a:t>and</a:t>
+            </a:r>
+            <a:r>
+              <a:rPr lang="en-GB" dirty="0" smtClean="0">
+                <a:solidFill>
+                  <a:srgbClr val="0070C0"/>
+                </a:solidFill>
+              </a:rPr>
+              <a:t> policies</a:t>
+            </a:r>
+            <a:r>
+              <a:rPr lang="pl-PL" dirty="0" smtClean="0">
+                <a:solidFill>
+                  <a:srgbClr val="0070C0"/>
+                </a:solidFill>
+              </a:rPr>
               <a:t>?</a:t>
             </a:r>
-            <a:endParaRPr lang="pl-PL" dirty="0" smtClean="0">
-              <a:solidFill>
-                <a:srgbClr val="0070C0"/>
-              </a:solidFill>
-            </a:endParaRPr>
-          </a:p>
-          <a:p>
-            <a:endParaRPr lang="en-GB" dirty="0">
-              <a:solidFill>
-                <a:srgbClr val="0070C0"/>
-              </a:solidFill>
-            </a:endParaRPr>
-          </a:p>
-          <a:p>
-            <a:r>
-              <a:rPr lang="en-GB" dirty="0">
-                <a:solidFill>
-                  <a:srgbClr val="0070C0"/>
-                </a:solidFill>
-              </a:rPr>
-              <a:t>What’s your favourite research data repository? Why?</a:t>
+            <a:br>
+              <a:rPr lang="pl-PL" dirty="0" smtClean="0">
+                <a:solidFill>
+                  <a:srgbClr val="0070C0"/>
+                </a:solidFill>
+              </a:rPr>
+            </a:br>
+            <a:r>
+              <a:rPr lang="pl-PL" dirty="0" smtClean="0">
+                <a:solidFill>
+                  <a:srgbClr val="0070C0"/>
+                </a:solidFill>
+              </a:rPr>
+              <a:t>	is it curated</a:t>
             </a:r>
           </a:p>
         </p:txBody>
@@ -5861,31 +5967,49 @@
           <a:lstStyle/>
           <a:p>
             <a:r>
-              <a:rPr lang="pl-PL" dirty="0" smtClean="0">
-                <a:solidFill>
-                  <a:srgbClr val="0070C0"/>
-                </a:solidFill>
-              </a:rPr>
-              <a:t>Repositories and FAIR</a:t>
-            </a:r>
-            <a:endParaRPr lang="en-GB" dirty="0">
-              <a:solidFill>
-                <a:srgbClr val="0070C0"/>
-              </a:solidFill>
-            </a:endParaRPr>
+              <a:rPr lang="en-GB" b="1" dirty="0">
+                <a:solidFill>
+                  <a:srgbClr val="0070C0"/>
+                </a:solidFill>
+              </a:rPr>
+              <a:t>Evaluating a </a:t>
+            </a:r>
+            <a:r>
+              <a:rPr lang="en-GB" b="1" dirty="0" smtClean="0">
+                <a:solidFill>
+                  <a:srgbClr val="0070C0"/>
+                </a:solidFill>
+              </a:rPr>
+              <a:t>data </a:t>
+            </a:r>
+            <a:r>
+              <a:rPr lang="en-GB" b="1" dirty="0">
+                <a:solidFill>
+                  <a:srgbClr val="0070C0"/>
+                </a:solidFill>
+              </a:rPr>
+              <a:t>repository</a:t>
+            </a:r>
           </a:p>
         </p:txBody>
       </p:sp>
     </p:spTree>
     <p:extLst>
       <p:ext uri="{BB962C8B-B14F-4D97-AF65-F5344CB8AC3E}">
-        <p14:creationId xmlns:p14="http://schemas.microsoft.com/office/powerpoint/2010/main" val="1815562741"/>
+        <p14:creationId xmlns:p14="http://schemas.microsoft.com/office/powerpoint/2010/main" val="2410312540"/>
       </p:ext>
     </p:extLst>
   </p:cSld>
   <p:clrMapOvr>
     <a:masterClrMapping/>
   </p:clrMapOvr>
+  <p:timing>
+    <p:tnLst>
+      <p:par>
+        <p:cTn id="1" dur="indefinite" restart="never" nodeType="tmRoot"/>
+      </p:par>
+    </p:tnLst>
+  </p:timing>
 </p:sld>
 </file>
 
@@ -5953,6 +6077,604 @@
           </a:extLst>
         </p:spPr>
       </p:pic>
+      <p:sp>
+        <p:nvSpPr>
+          <p:cNvPr id="2" name="Rectangle 1"/>
+          <p:cNvSpPr/>
+          <p:nvPr/>
+        </p:nvSpPr>
+        <p:spPr>
+          <a:xfrm>
+            <a:off x="742384" y="2064189"/>
+            <a:ext cx="10981854" cy="3416320"/>
+          </a:xfrm>
+          <a:prstGeom prst="rect">
+            <a:avLst/>
+          </a:prstGeom>
+        </p:spPr>
+        <p:txBody>
+          <a:bodyPr wrap="square">
+            <a:spAutoFit/>
+          </a:bodyPr>
+          <a:lstStyle/>
+          <a:p>
+            <a:endParaRPr lang="pl-PL" dirty="0" err="1" smtClean="0"/>
+          </a:p>
+          <a:p>
+            <a:pPr marL="285750" indent="-285750">
+              <a:buFont typeface="Arial" panose="020B0604020202020204" pitchFamily="34" charset="0"/>
+              <a:buChar char="•"/>
+            </a:pPr>
+            <a:r>
+              <a:rPr lang="en-GB" dirty="0" smtClean="0">
+                <a:solidFill>
+                  <a:srgbClr val="0070C0"/>
+                </a:solidFill>
+              </a:rPr>
+              <a:t>Find suitable repository(</a:t>
+            </a:r>
+            <a:r>
+              <a:rPr lang="en-GB" dirty="0" err="1" smtClean="0">
+                <a:solidFill>
+                  <a:srgbClr val="0070C0"/>
+                </a:solidFill>
+              </a:rPr>
+              <a:t>ies</a:t>
+            </a:r>
+            <a:r>
+              <a:rPr lang="en-GB" dirty="0" smtClean="0">
+                <a:solidFill>
+                  <a:srgbClr val="0070C0"/>
+                </a:solidFill>
+              </a:rPr>
+              <a:t>) as soon as you get your data</a:t>
+            </a:r>
+            <a:endParaRPr lang="pl-PL" dirty="0" smtClean="0">
+              <a:solidFill>
+                <a:srgbClr val="0070C0"/>
+              </a:solidFill>
+            </a:endParaRPr>
+          </a:p>
+          <a:p>
+            <a:pPr marL="285750" indent="-285750">
+              <a:buFont typeface="Arial" panose="020B0604020202020204" pitchFamily="34" charset="0"/>
+              <a:buChar char="•"/>
+            </a:pPr>
+            <a:endParaRPr lang="en-GB" dirty="0" smtClean="0">
+              <a:solidFill>
+                <a:srgbClr val="0070C0"/>
+              </a:solidFill>
+            </a:endParaRPr>
+          </a:p>
+          <a:p>
+            <a:pPr marL="285750" indent="-285750">
+              <a:buFont typeface="Arial" panose="020B0604020202020204" pitchFamily="34" charset="0"/>
+              <a:buChar char="•"/>
+            </a:pPr>
+            <a:r>
+              <a:rPr lang="en-GB" dirty="0" smtClean="0">
+                <a:solidFill>
+                  <a:srgbClr val="0070C0"/>
+                </a:solidFill>
+              </a:rPr>
+              <a:t>If repository permits embargo deposit data as soon as you get it (especially if analysed externally)</a:t>
+            </a:r>
+          </a:p>
+          <a:p>
+            <a:pPr marL="285750" indent="-285750">
+              <a:buFont typeface="Arial" panose="020B0604020202020204" pitchFamily="34" charset="0"/>
+              <a:buChar char="•"/>
+            </a:pPr>
+            <a:endParaRPr lang="pl-PL" dirty="0" smtClean="0">
+              <a:solidFill>
+                <a:srgbClr val="0070C0"/>
+              </a:solidFill>
+            </a:endParaRPr>
+          </a:p>
+          <a:p>
+            <a:pPr marL="285750" indent="-285750">
+              <a:buFont typeface="Arial" panose="020B0604020202020204" pitchFamily="34" charset="0"/>
+              <a:buChar char="•"/>
+            </a:pPr>
+            <a:r>
+              <a:rPr lang="en-GB" dirty="0" smtClean="0">
+                <a:solidFill>
+                  <a:srgbClr val="0070C0"/>
+                </a:solidFill>
+              </a:rPr>
+              <a:t>Deposit simultaneously to a very specialized repo and a „main stream” one</a:t>
+            </a:r>
+            <a:r>
+              <a:rPr lang="pl-PL" dirty="0" smtClean="0">
+                <a:solidFill>
+                  <a:srgbClr val="0070C0"/>
+                </a:solidFill>
+              </a:rPr>
+              <a:t> (better discovery)</a:t>
+            </a:r>
+            <a:endParaRPr lang="en-GB" dirty="0" smtClean="0">
+              <a:solidFill>
+                <a:srgbClr val="0070C0"/>
+              </a:solidFill>
+            </a:endParaRPr>
+          </a:p>
+          <a:p>
+            <a:pPr marL="285750" indent="-285750">
+              <a:buFont typeface="Arial" panose="020B0604020202020204" pitchFamily="34" charset="0"/>
+              <a:buChar char="•"/>
+            </a:pPr>
+            <a:endParaRPr lang="pl-PL" dirty="0" smtClean="0">
+              <a:solidFill>
+                <a:srgbClr val="0070C0"/>
+              </a:solidFill>
+            </a:endParaRPr>
+          </a:p>
+          <a:p>
+            <a:pPr marL="285750" indent="-285750">
+              <a:buFont typeface="Arial" panose="020B0604020202020204" pitchFamily="34" charset="0"/>
+              <a:buChar char="•"/>
+            </a:pPr>
+            <a:r>
+              <a:rPr lang="en-GB" dirty="0" smtClean="0">
+                <a:solidFill>
+                  <a:srgbClr val="0070C0"/>
+                </a:solidFill>
+              </a:rPr>
+              <a:t>Cross link your repositories records </a:t>
+            </a:r>
+          </a:p>
+          <a:p>
+            <a:pPr marL="285750" indent="-285750">
+              <a:buFont typeface="Arial" panose="020B0604020202020204" pitchFamily="34" charset="0"/>
+              <a:buChar char="•"/>
+            </a:pPr>
+            <a:endParaRPr lang="pl-PL" dirty="0" smtClean="0">
+              <a:solidFill>
+                <a:srgbClr val="0070C0"/>
+              </a:solidFill>
+            </a:endParaRPr>
+          </a:p>
+          <a:p>
+            <a:pPr marL="285750" indent="-285750">
+              <a:buFont typeface="Arial" panose="020B0604020202020204" pitchFamily="34" charset="0"/>
+              <a:buChar char="•"/>
+            </a:pPr>
+            <a:r>
+              <a:rPr lang="en-GB" dirty="0" smtClean="0">
+                <a:solidFill>
+                  <a:srgbClr val="0070C0"/>
+                </a:solidFill>
+              </a:rPr>
+              <a:t>Add </a:t>
+            </a:r>
+            <a:r>
+              <a:rPr lang="en-GB" dirty="0" smtClean="0">
+                <a:solidFill>
+                  <a:srgbClr val="0070C0"/>
+                </a:solidFill>
+              </a:rPr>
+              <a:t>data availability</a:t>
+            </a:r>
+            <a:r>
+              <a:rPr lang="pl-PL" dirty="0" smtClean="0">
+                <a:solidFill>
+                  <a:srgbClr val="0070C0"/>
+                </a:solidFill>
+              </a:rPr>
+              <a:t> section to your papers and list all the public records</a:t>
+            </a:r>
+          </a:p>
+          <a:p>
+            <a:pPr marL="285750" indent="-285750">
+              <a:buFont typeface="Arial" panose="020B0604020202020204" pitchFamily="34" charset="0"/>
+              <a:buChar char="•"/>
+            </a:pPr>
+            <a:endParaRPr lang="pl-PL" dirty="0">
+              <a:solidFill>
+                <a:srgbClr val="0070C0"/>
+              </a:solidFill>
+            </a:endParaRPr>
+          </a:p>
+          <a:p>
+            <a:pPr marL="285750" indent="-285750">
+              <a:buFont typeface="Arial" panose="020B0604020202020204" pitchFamily="34" charset="0"/>
+              <a:buChar char="•"/>
+            </a:pPr>
+            <a:r>
+              <a:rPr lang="pl-PL" dirty="0" smtClean="0">
+                <a:solidFill>
+                  <a:srgbClr val="0070C0"/>
+                </a:solidFill>
+              </a:rPr>
+              <a:t>List your data sets in ORCID</a:t>
+            </a:r>
+            <a:r>
+              <a:rPr lang="en-GB" dirty="0" smtClean="0">
+                <a:solidFill>
+                  <a:srgbClr val="0070C0"/>
+                </a:solidFill>
+              </a:rPr>
+              <a:t> </a:t>
+            </a:r>
+            <a:endParaRPr lang="en-GB" dirty="0">
+              <a:solidFill>
+                <a:srgbClr val="0070C0"/>
+              </a:solidFill>
+            </a:endParaRPr>
+          </a:p>
+        </p:txBody>
+      </p:sp>
+      <p:sp>
+        <p:nvSpPr>
+          <p:cNvPr id="5" name="Title 1">
+            <a:extLst>
+              <a:ext uri="{FF2B5EF4-FFF2-40B4-BE49-F238E27FC236}">
+                <a16:creationId xmlns:a16="http://schemas.microsoft.com/office/drawing/2014/main" id="{775BFE92-9990-4094-B7B2-01514614F16E}"/>
+              </a:ext>
+            </a:extLst>
+          </p:cNvPr>
+          <p:cNvSpPr>
+            <a:spLocks noGrp="1"/>
+          </p:cNvSpPr>
+          <p:nvPr>
+            <p:ph type="title"/>
+          </p:nvPr>
+        </p:nvSpPr>
+        <p:spPr>
+          <a:xfrm>
+            <a:off x="838200" y="365125"/>
+            <a:ext cx="10515600" cy="1325563"/>
+          </a:xfrm>
+        </p:spPr>
+        <p:txBody>
+          <a:bodyPr/>
+          <a:lstStyle/>
+          <a:p>
+            <a:r>
+              <a:rPr lang="pl-PL" dirty="0" smtClean="0">
+                <a:solidFill>
+                  <a:srgbClr val="0070C0"/>
+                </a:solidFill>
+              </a:rPr>
+              <a:t>Repositories </a:t>
+            </a:r>
+            <a:r>
+              <a:rPr lang="pl-PL" dirty="0" smtClean="0">
+                <a:solidFill>
+                  <a:srgbClr val="0070C0"/>
+                </a:solidFill>
+              </a:rPr>
+              <a:t>Summary</a:t>
+            </a:r>
+            <a:endParaRPr lang="en-GB" dirty="0">
+              <a:solidFill>
+                <a:srgbClr val="0070C0"/>
+              </a:solidFill>
+            </a:endParaRPr>
+          </a:p>
+        </p:txBody>
+      </p:sp>
+    </p:spTree>
+    <p:extLst>
+      <p:ext uri="{BB962C8B-B14F-4D97-AF65-F5344CB8AC3E}">
+        <p14:creationId xmlns:p14="http://schemas.microsoft.com/office/powerpoint/2010/main" val="2464484896"/>
+      </p:ext>
+    </p:extLst>
+  </p:cSld>
+  <p:clrMapOvr>
+    <a:masterClrMapping/>
+  </p:clrMapOvr>
+  <p:timing>
+    <p:tnLst>
+      <p:par>
+        <p:cTn id="1" dur="indefinite" restart="never" nodeType="tmRoot"/>
+      </p:par>
+    </p:tnLst>
+  </p:timing>
+</p:sld>
+</file>
+
+<file path=ppt/slides/slide17.xml><?xml version="1.0" encoding="utf-8"?>
+<p:sld xmlns:a="http://schemas.openxmlformats.org/drawingml/2006/main" xmlns:r="http://schemas.openxmlformats.org/officeDocument/2006/relationships" xmlns:p="http://schemas.openxmlformats.org/presentationml/2006/main">
+  <p:cSld>
+    <p:spTree>
+      <p:nvGrpSpPr>
+        <p:cNvPr id="1" name=""/>
+        <p:cNvGrpSpPr/>
+        <p:nvPr/>
+      </p:nvGrpSpPr>
+      <p:grpSpPr>
+        <a:xfrm>
+          <a:off x="0" y="0"/>
+          <a:ext cx="0" cy="0"/>
+          <a:chOff x="0" y="0"/>
+          <a:chExt cx="0" cy="0"/>
+        </a:xfrm>
+      </p:grpSpPr>
+      <p:pic>
+        <p:nvPicPr>
+          <p:cNvPr id="4" name="Picture 2" descr="Ed_DaSH">
+            <a:extLst>
+              <a:ext uri="{FF2B5EF4-FFF2-40B4-BE49-F238E27FC236}">
+                <a16:creationId xmlns:a16="http://schemas.microsoft.com/office/drawing/2014/main" id="{A783256F-E39E-4712-96B0-240BD611CFEB}"/>
+              </a:ext>
+            </a:extLst>
+          </p:cNvPr>
+          <p:cNvPicPr>
+            <a:picLocks noChangeAspect="1" noChangeArrowheads="1"/>
+          </p:cNvPicPr>
+          <p:nvPr/>
+        </p:nvPicPr>
+        <p:blipFill>
+          <a:blip r:embed="rId2" cstate="hqprint">
+            <a:extLst>
+              <a:ext uri="{28A0092B-C50C-407E-A947-70E740481C1C}">
+                <a14:useLocalDpi xmlns:a14="http://schemas.microsoft.com/office/drawing/2010/main" val="0"/>
+              </a:ext>
+            </a:extLst>
+          </a:blip>
+          <a:srcRect/>
+          <a:stretch>
+            <a:fillRect/>
+          </a:stretch>
+        </p:blipFill>
+        <p:spPr bwMode="auto">
+          <a:xfrm>
+            <a:off x="10820670" y="5458691"/>
+            <a:ext cx="1289214" cy="1325418"/>
+          </a:xfrm>
+          <a:prstGeom prst="rect">
+            <a:avLst/>
+          </a:prstGeom>
+          <a:noFill/>
+          <a:extLst>
+            <a:ext uri="{909E8E84-426E-40DD-AFC4-6F175D3DCCD1}">
+              <a14:hiddenFill xmlns:a14="http://schemas.microsoft.com/office/drawing/2010/main">
+                <a:solidFill>
+                  <a:srgbClr val="FFFFFF"/>
+                </a:solidFill>
+              </a14:hiddenFill>
+            </a:ext>
+          </a:extLst>
+        </p:spPr>
+      </p:pic>
+      <p:sp>
+        <p:nvSpPr>
+          <p:cNvPr id="2" name="Rectangle 1"/>
+          <p:cNvSpPr/>
+          <p:nvPr/>
+        </p:nvSpPr>
+        <p:spPr>
+          <a:xfrm>
+            <a:off x="742384" y="2064189"/>
+            <a:ext cx="10981854" cy="2031325"/>
+          </a:xfrm>
+          <a:prstGeom prst="rect">
+            <a:avLst/>
+          </a:prstGeom>
+        </p:spPr>
+        <p:txBody>
+          <a:bodyPr wrap="square">
+            <a:spAutoFit/>
+          </a:bodyPr>
+          <a:lstStyle/>
+          <a:p>
+            <a:endParaRPr lang="pl-PL" dirty="0" err="1" smtClean="0"/>
+          </a:p>
+          <a:p>
+            <a:r>
+              <a:rPr lang="en-GB" dirty="0">
+                <a:solidFill>
+                  <a:srgbClr val="0070C0"/>
+                </a:solidFill>
+              </a:rPr>
+              <a:t>Why is choosing a domain specific repositories over </a:t>
+            </a:r>
+            <a:r>
+              <a:rPr lang="en-GB" dirty="0" err="1">
+                <a:solidFill>
+                  <a:srgbClr val="0070C0"/>
+                </a:solidFill>
+              </a:rPr>
+              <a:t>zenodo</a:t>
+            </a:r>
+            <a:r>
+              <a:rPr lang="en-GB" dirty="0">
+                <a:solidFill>
+                  <a:srgbClr val="0070C0"/>
+                </a:solidFill>
+              </a:rPr>
+              <a:t> more FAIR</a:t>
+            </a:r>
+            <a:r>
+              <a:rPr lang="en-GB" dirty="0" smtClean="0">
+                <a:solidFill>
+                  <a:srgbClr val="0070C0"/>
+                </a:solidFill>
+              </a:rPr>
+              <a:t>?</a:t>
+            </a:r>
+            <a:endParaRPr lang="pl-PL" dirty="0" smtClean="0">
+              <a:solidFill>
+                <a:srgbClr val="0070C0"/>
+              </a:solidFill>
+            </a:endParaRPr>
+          </a:p>
+          <a:p>
+            <a:endParaRPr lang="en-GB" dirty="0">
+              <a:solidFill>
+                <a:srgbClr val="0070C0"/>
+              </a:solidFill>
+            </a:endParaRPr>
+          </a:p>
+          <a:p>
+            <a:r>
+              <a:rPr lang="en-GB" dirty="0">
+                <a:solidFill>
+                  <a:srgbClr val="0070C0"/>
+                </a:solidFill>
+              </a:rPr>
+              <a:t>How can selecting a repository for your data as soon as you do an experiment (or even before!) can benefit you research and help your data become FAIR</a:t>
+            </a:r>
+            <a:r>
+              <a:rPr lang="en-GB" dirty="0" smtClean="0">
+                <a:solidFill>
+                  <a:srgbClr val="0070C0"/>
+                </a:solidFill>
+              </a:rPr>
+              <a:t>?</a:t>
+            </a:r>
+            <a:endParaRPr lang="pl-PL" dirty="0" smtClean="0">
+              <a:solidFill>
+                <a:srgbClr val="0070C0"/>
+              </a:solidFill>
+            </a:endParaRPr>
+          </a:p>
+          <a:p>
+            <a:endParaRPr lang="en-GB" dirty="0">
+              <a:solidFill>
+                <a:srgbClr val="0070C0"/>
+              </a:solidFill>
+            </a:endParaRPr>
+          </a:p>
+          <a:p>
+            <a:r>
+              <a:rPr lang="en-GB" dirty="0">
+                <a:solidFill>
+                  <a:srgbClr val="0070C0"/>
+                </a:solidFill>
+              </a:rPr>
+              <a:t>What’s your favourite research data repository? Why?</a:t>
+            </a:r>
+          </a:p>
+        </p:txBody>
+      </p:sp>
+      <p:sp>
+        <p:nvSpPr>
+          <p:cNvPr id="5" name="Title 1">
+            <a:extLst>
+              <a:ext uri="{FF2B5EF4-FFF2-40B4-BE49-F238E27FC236}">
+                <a16:creationId xmlns:a16="http://schemas.microsoft.com/office/drawing/2014/main" id="{775BFE92-9990-4094-B7B2-01514614F16E}"/>
+              </a:ext>
+            </a:extLst>
+          </p:cNvPr>
+          <p:cNvSpPr>
+            <a:spLocks noGrp="1"/>
+          </p:cNvSpPr>
+          <p:nvPr>
+            <p:ph type="title"/>
+          </p:nvPr>
+        </p:nvSpPr>
+        <p:spPr>
+          <a:xfrm>
+            <a:off x="838200" y="365125"/>
+            <a:ext cx="10515600" cy="1325563"/>
+          </a:xfrm>
+        </p:spPr>
+        <p:txBody>
+          <a:bodyPr/>
+          <a:lstStyle/>
+          <a:p>
+            <a:r>
+              <a:rPr lang="pl-PL" dirty="0" smtClean="0">
+                <a:solidFill>
+                  <a:srgbClr val="0070C0"/>
+                </a:solidFill>
+              </a:rPr>
+              <a:t>Repositories and FAIR</a:t>
+            </a:r>
+            <a:endParaRPr lang="en-GB" dirty="0">
+              <a:solidFill>
+                <a:srgbClr val="0070C0"/>
+              </a:solidFill>
+            </a:endParaRPr>
+          </a:p>
+        </p:txBody>
+      </p:sp>
+    </p:spTree>
+    <p:extLst>
+      <p:ext uri="{BB962C8B-B14F-4D97-AF65-F5344CB8AC3E}">
+        <p14:creationId xmlns:p14="http://schemas.microsoft.com/office/powerpoint/2010/main" val="1815562741"/>
+      </p:ext>
+    </p:extLst>
+  </p:cSld>
+  <p:clrMapOvr>
+    <a:masterClrMapping/>
+  </p:clrMapOvr>
+  <p:timing>
+    <p:tnLst>
+      <p:par>
+        <p:cTn id="1" dur="indefinite" restart="never" nodeType="tmRoot"/>
+      </p:par>
+    </p:tnLst>
+  </p:timing>
+</p:sld>
+</file>
+
+<file path=ppt/slides/slide18.xml><?xml version="1.0" encoding="utf-8"?>
+<p:sld xmlns:a="http://schemas.openxmlformats.org/drawingml/2006/main" xmlns:r="http://schemas.openxmlformats.org/officeDocument/2006/relationships" xmlns:p="http://schemas.openxmlformats.org/presentationml/2006/main">
+  <p:cSld>
+    <p:spTree>
+      <p:nvGrpSpPr>
+        <p:cNvPr id="1" name=""/>
+        <p:cNvGrpSpPr/>
+        <p:nvPr/>
+      </p:nvGrpSpPr>
+      <p:grpSpPr>
+        <a:xfrm>
+          <a:off x="0" y="0"/>
+          <a:ext cx="0" cy="0"/>
+          <a:chOff x="0" y="0"/>
+          <a:chExt cx="0" cy="0"/>
+        </a:xfrm>
+      </p:grpSpPr>
+      <p:pic>
+        <p:nvPicPr>
+          <p:cNvPr id="4" name="Picture 2" descr="Ed_DaSH">
+            <a:extLst>
+              <a:ext uri="{FF2B5EF4-FFF2-40B4-BE49-F238E27FC236}">
+                <a16:creationId xmlns:a16="http://schemas.microsoft.com/office/drawing/2014/main" id="{A783256F-E39E-4712-96B0-240BD611CFEB}"/>
+              </a:ext>
+            </a:extLst>
+          </p:cNvPr>
+          <p:cNvPicPr>
+            <a:picLocks noChangeAspect="1" noChangeArrowheads="1"/>
+          </p:cNvPicPr>
+          <p:nvPr/>
+        </p:nvPicPr>
+        <p:blipFill>
+          <a:blip r:embed="rId2" cstate="hqprint">
+            <a:extLst>
+              <a:ext uri="{28A0092B-C50C-407E-A947-70E740481C1C}">
+                <a14:useLocalDpi xmlns:a14="http://schemas.microsoft.com/office/drawing/2010/main" val="0"/>
+              </a:ext>
+            </a:extLst>
+          </a:blip>
+          <a:srcRect/>
+          <a:stretch>
+            <a:fillRect/>
+          </a:stretch>
+        </p:blipFill>
+        <p:spPr bwMode="auto">
+          <a:xfrm>
+            <a:off x="10820670" y="5458691"/>
+            <a:ext cx="1289214" cy="1325418"/>
+          </a:xfrm>
+          <a:prstGeom prst="rect">
+            <a:avLst/>
+          </a:prstGeom>
+          <a:noFill/>
+          <a:extLst>
+            <a:ext uri="{909E8E84-426E-40DD-AFC4-6F175D3DCCD1}">
+              <a14:hiddenFill xmlns:a14="http://schemas.microsoft.com/office/drawing/2010/main">
+                <a:solidFill>
+                  <a:srgbClr val="FFFFFF"/>
+                </a:solidFill>
+              </a14:hiddenFill>
+            </a:ext>
+          </a:extLst>
+        </p:spPr>
+      </p:pic>
     </p:spTree>
     <p:extLst>
       <p:ext uri="{BB962C8B-B14F-4D97-AF65-F5344CB8AC3E}">
@@ -5963,6 +6685,13 @@
   <p:clrMapOvr>
     <a:masterClrMapping/>
   </p:clrMapOvr>
+  <p:timing>
+    <p:tnLst>
+      <p:par>
+        <p:cTn id="1" dur="indefinite" restart="never" nodeType="tmRoot"/>
+      </p:par>
+    </p:tnLst>
+  </p:timing>
 </p:sld>
 </file>
 
@@ -6087,6 +6816,13 @@
   <p:clrMapOvr>
     <a:masterClrMapping/>
   </p:clrMapOvr>
+  <p:timing>
+    <p:tnLst>
+      <p:par>
+        <p:cTn id="1" dur="indefinite" restart="never" nodeType="tmRoot"/>
+      </p:par>
+    </p:tnLst>
+  </p:timing>
 </p:sld>
 </file>
 
@@ -6107,12 +6843,141 @@
           <a:chExt cx="0" cy="0"/>
         </a:xfrm>
       </p:grpSpPr>
+      <p:sp>
+        <p:nvSpPr>
+          <p:cNvPr id="5" name="TextBox 4">
+            <a:extLst>
+              <a:ext uri="{FF2B5EF4-FFF2-40B4-BE49-F238E27FC236}">
+                <a16:creationId xmlns:a16="http://schemas.microsoft.com/office/drawing/2014/main" id="{3A7A1F5C-9C70-4DE3-BA39-7835B2935EB3}"/>
+              </a:ext>
+            </a:extLst>
+          </p:cNvPr>
+          <p:cNvSpPr txBox="1"/>
+          <p:nvPr/>
+        </p:nvSpPr>
+        <p:spPr>
+          <a:xfrm>
+            <a:off x="948099" y="1355649"/>
+            <a:ext cx="8837169" cy="3970318"/>
+          </a:xfrm>
+          <a:prstGeom prst="rect">
+            <a:avLst/>
+          </a:prstGeom>
+          <a:noFill/>
+        </p:spPr>
+        <p:txBody>
+          <a:bodyPr wrap="square">
+            <a:spAutoFit/>
+          </a:bodyPr>
+          <a:lstStyle/>
+          <a:p>
+            <a:r>
+              <a:rPr lang="en-GB" sz="2800" dirty="0">
+                <a:solidFill>
+                  <a:srgbClr val="0070C0"/>
+                </a:solidFill>
+              </a:rPr>
+              <a:t>Research data repositories are online repositories that enable the preservation, curation and publication of research ‘products</a:t>
+            </a:r>
+            <a:r>
+              <a:rPr lang="en-GB" sz="2800" dirty="0" smtClean="0">
+                <a:solidFill>
+                  <a:srgbClr val="0070C0"/>
+                </a:solidFill>
+              </a:rPr>
+              <a:t>’:</a:t>
+            </a:r>
+            <a:endParaRPr lang="pl-PL" sz="2800" dirty="0" smtClean="0">
+              <a:solidFill>
+                <a:srgbClr val="0070C0"/>
+              </a:solidFill>
+            </a:endParaRPr>
+          </a:p>
+          <a:p>
+            <a:endParaRPr lang="en-GB" sz="2800" dirty="0">
+              <a:solidFill>
+                <a:srgbClr val="0070C0"/>
+              </a:solidFill>
+            </a:endParaRPr>
+          </a:p>
+          <a:p>
+            <a:pPr marL="457200" indent="-457200">
+              <a:buFont typeface="Arial" panose="020B0604020202020204" pitchFamily="34" charset="0"/>
+              <a:buChar char="•"/>
+            </a:pPr>
+            <a:r>
+              <a:rPr lang="pl-PL" sz="2800" dirty="0" smtClean="0">
+                <a:solidFill>
+                  <a:srgbClr val="0070C0"/>
+                </a:solidFill>
+              </a:rPr>
+              <a:t>data</a:t>
+            </a:r>
+            <a:endParaRPr lang="en-GB" sz="2800" dirty="0">
+              <a:solidFill>
+                <a:srgbClr val="0070C0"/>
+              </a:solidFill>
+            </a:endParaRPr>
+          </a:p>
+          <a:p>
+            <a:pPr marL="457200" indent="-457200">
+              <a:buFont typeface="Arial" panose="020B0604020202020204" pitchFamily="34" charset="0"/>
+              <a:buChar char="•"/>
+            </a:pPr>
+            <a:r>
+              <a:rPr lang="pl-PL" sz="2800" dirty="0" smtClean="0">
+                <a:solidFill>
+                  <a:srgbClr val="0070C0"/>
+                </a:solidFill>
+              </a:rPr>
+              <a:t>code</a:t>
+            </a:r>
+          </a:p>
+          <a:p>
+            <a:pPr marL="457200" indent="-457200">
+              <a:buFont typeface="Arial" panose="020B0604020202020204" pitchFamily="34" charset="0"/>
+              <a:buChar char="•"/>
+            </a:pPr>
+            <a:r>
+              <a:rPr lang="pl-PL" sz="2800" dirty="0" smtClean="0">
+                <a:solidFill>
+                  <a:srgbClr val="0070C0"/>
+                </a:solidFill>
+              </a:rPr>
+              <a:t>protocols</a:t>
+            </a:r>
+            <a:endParaRPr lang="en-GB" sz="2800" dirty="0">
+              <a:solidFill>
+                <a:srgbClr val="0070C0"/>
+              </a:solidFill>
+            </a:endParaRPr>
+          </a:p>
+          <a:p>
+            <a:pPr marL="457200" indent="-457200">
+              <a:buFont typeface="Arial" panose="020B0604020202020204" pitchFamily="34" charset="0"/>
+              <a:buChar char="•"/>
+            </a:pPr>
+            <a:endParaRPr lang="en-GB" sz="2800" dirty="0">
+              <a:solidFill>
+                <a:srgbClr val="0070C0"/>
+              </a:solidFill>
+            </a:endParaRPr>
+          </a:p>
+          <a:p>
+            <a:endParaRPr lang="en-GB" sz="2800" dirty="0">
+              <a:solidFill>
+                <a:srgbClr val="0070C0"/>
+              </a:solidFill>
+            </a:endParaRPr>
+          </a:p>
+        </p:txBody>
+      </p:sp>
       <p:pic>
         <p:nvPicPr>
-          <p:cNvPr id="4" name="Picture 2" descr="Ed_DaSH">
-            <a:extLst>
-              <a:ext uri="{FF2B5EF4-FFF2-40B4-BE49-F238E27FC236}">
-                <a16:creationId xmlns:a16="http://schemas.microsoft.com/office/drawing/2014/main" id="{A783256F-E39E-4712-96B0-240BD611CFEB}"/>
+          <p:cNvPr id="6" name="Picture 2" descr="Ed_DaSH">
+            <a:extLst>
+              <a:ext uri="{FF2B5EF4-FFF2-40B4-BE49-F238E27FC236}">
+                <a16:creationId xmlns:a16="http://schemas.microsoft.com/office/drawing/2014/main" id="{6F3CF586-06D2-46C3-A4A3-130E31C4A16F}"/>
               </a:ext>
             </a:extLst>
           </p:cNvPr>
@@ -6154,174 +7019,23 @@
           </a:extLst>
         </p:spPr>
       </p:pic>
-      <p:sp>
-        <p:nvSpPr>
-          <p:cNvPr id="3" name="Title 1">
-            <a:extLst>
-              <a:ext uri="{FF2B5EF4-FFF2-40B4-BE49-F238E27FC236}">
-                <a16:creationId xmlns:a16="http://schemas.microsoft.com/office/drawing/2014/main" id="{775BFE92-9990-4094-B7B2-01514614F16E}"/>
-              </a:ext>
-            </a:extLst>
-          </p:cNvPr>
-          <p:cNvSpPr>
-            <a:spLocks noGrp="1"/>
-          </p:cNvSpPr>
-          <p:nvPr>
-            <p:ph type="title"/>
-          </p:nvPr>
-        </p:nvSpPr>
-        <p:spPr>
-          <a:xfrm>
-            <a:off x="838200" y="365125"/>
-            <a:ext cx="10515600" cy="1325563"/>
-          </a:xfrm>
-        </p:spPr>
-        <p:txBody>
-          <a:bodyPr/>
-          <a:lstStyle/>
-          <a:p>
-            <a:r>
-              <a:rPr lang="en-GB" dirty="0">
-                <a:solidFill>
-                  <a:srgbClr val="0070C0"/>
-                </a:solidFill>
-              </a:rPr>
-              <a:t>FAIR principles</a:t>
-            </a:r>
-          </a:p>
-        </p:txBody>
-      </p:sp>
-      <p:sp>
-        <p:nvSpPr>
-          <p:cNvPr id="5" name="Rectangle 4">
-            <a:extLst>
-              <a:ext uri="{FF2B5EF4-FFF2-40B4-BE49-F238E27FC236}">
-                <a16:creationId xmlns:a16="http://schemas.microsoft.com/office/drawing/2014/main" id="{04AEE4B5-946D-4302-AC98-9937AF758DFD}"/>
-              </a:ext>
-            </a:extLst>
-          </p:cNvPr>
-          <p:cNvSpPr/>
-          <p:nvPr/>
-        </p:nvSpPr>
-        <p:spPr>
-          <a:xfrm>
-            <a:off x="633167" y="1423550"/>
-            <a:ext cx="10925666" cy="4708981"/>
-          </a:xfrm>
-          <a:prstGeom prst="rect">
-            <a:avLst/>
-          </a:prstGeom>
-        </p:spPr>
-        <p:txBody>
-          <a:bodyPr wrap="square">
-            <a:spAutoFit/>
-          </a:bodyPr>
-          <a:lstStyle/>
-          <a:p>
-            <a:r>
-              <a:rPr lang="en-GB" sz="2000" b="1" dirty="0">
-                <a:solidFill>
-                  <a:srgbClr val="0070C0"/>
-                </a:solidFill>
-              </a:rPr>
-              <a:t>Findable</a:t>
-            </a:r>
-            <a:r>
-              <a:rPr lang="en-GB" sz="2000" dirty="0">
-                <a:solidFill>
-                  <a:srgbClr val="0070C0"/>
-                </a:solidFill>
-              </a:rPr>
-              <a:t>:  Easy to find the data and the metadata for both humans and computers. Automatic and reliable discovery of datasets and services depends on machine-readable persistent identifiers (PIDs) and metadata.</a:t>
-            </a:r>
-          </a:p>
-          <a:p>
-            <a:endParaRPr lang="en-GB" sz="2000" dirty="0">
-              <a:solidFill>
-                <a:srgbClr val="0070C0"/>
-              </a:solidFill>
-            </a:endParaRPr>
-          </a:p>
-          <a:p>
-            <a:r>
-              <a:rPr lang="en-GB" sz="2000" b="1" dirty="0">
-                <a:solidFill>
-                  <a:srgbClr val="0070C0"/>
-                </a:solidFill>
-              </a:rPr>
-              <a:t>Accessible</a:t>
-            </a:r>
-            <a:r>
-              <a:rPr lang="en-GB" sz="2000" dirty="0">
-                <a:solidFill>
-                  <a:srgbClr val="0070C0"/>
-                </a:solidFill>
-              </a:rPr>
-              <a:t>: The (meta)data retrievable by their identifier using a standardised and open communications protocol (including authentication and authorisation). Metadata should be available even when the data are no longer available.</a:t>
-            </a:r>
-          </a:p>
-          <a:p>
-            <a:endParaRPr lang="en-GB" sz="2000" dirty="0">
-              <a:solidFill>
-                <a:srgbClr val="0070C0"/>
-              </a:solidFill>
-            </a:endParaRPr>
-          </a:p>
-          <a:p>
-            <a:r>
-              <a:rPr lang="en-GB" sz="2000" b="1" dirty="0">
-                <a:solidFill>
-                  <a:srgbClr val="0070C0"/>
-                </a:solidFill>
-              </a:rPr>
-              <a:t>Interoperable</a:t>
-            </a:r>
-            <a:r>
-              <a:rPr lang="en-GB" sz="2000" dirty="0">
-                <a:solidFill>
-                  <a:srgbClr val="0070C0"/>
-                </a:solidFill>
-              </a:rPr>
-              <a:t>: The data should be able to be combined with and used with other data or tools. The format of the data should be open and interpretable for various tools. It applies both to the data and metadata, the (meta)data should use vocabularies that follow FAIR principles.</a:t>
-            </a:r>
-          </a:p>
-          <a:p>
-            <a:endParaRPr lang="en-GB" sz="2000" dirty="0">
-              <a:solidFill>
-                <a:srgbClr val="0070C0"/>
-              </a:solidFill>
-            </a:endParaRPr>
-          </a:p>
-          <a:p>
-            <a:r>
-              <a:rPr lang="en-GB" sz="2000" b="1" dirty="0">
-                <a:solidFill>
-                  <a:srgbClr val="0070C0"/>
-                </a:solidFill>
-              </a:rPr>
-              <a:t>Re-usable</a:t>
-            </a:r>
-            <a:r>
-              <a:rPr lang="en-GB" sz="2000" dirty="0">
-                <a:solidFill>
-                  <a:srgbClr val="0070C0"/>
-                </a:solidFill>
-              </a:rPr>
-              <a:t>: FAIR aims at optimising the reuse of data. Metadata and data should be well-described so that they can be replicated and/or combined in different settings. The reuse of the (meta)data should be stated with clear and accessible license(s)</a:t>
-            </a:r>
-          </a:p>
-        </p:txBody>
-      </p:sp>
     </p:spTree>
     <p:extLst>
       <p:ext uri="{BB962C8B-B14F-4D97-AF65-F5344CB8AC3E}">
-        <p14:creationId xmlns:p14="http://schemas.microsoft.com/office/powerpoint/2010/main" val="2549351315"/>
+        <p14:creationId xmlns:p14="http://schemas.microsoft.com/office/powerpoint/2010/main" val="4286087962"/>
       </p:ext>
     </p:extLst>
   </p:cSld>
   <p:clrMapOvr>
     <a:masterClrMapping/>
   </p:clrMapOvr>
+  <p:timing>
+    <p:tnLst>
+      <p:par>
+        <p:cTn id="1" dur="indefinite" restart="never" nodeType="tmRoot"/>
+      </p:par>
+    </p:tnLst>
+  </p:timing>
 </p:sld>
 </file>
 
@@ -6357,7 +7071,7 @@
         <p:spPr>
           <a:xfrm>
             <a:off x="948099" y="1355649"/>
-            <a:ext cx="8837169" cy="3970318"/>
+            <a:ext cx="8837169" cy="1815882"/>
           </a:xfrm>
           <a:prstGeom prst="rect">
             <a:avLst/>
@@ -6371,79 +7085,22 @@
           <a:lstStyle/>
           <a:p>
             <a:r>
-              <a:rPr lang="en-GB" sz="2800" dirty="0">
-                <a:solidFill>
-                  <a:srgbClr val="0070C0"/>
-                </a:solidFill>
-              </a:rPr>
-              <a:t>Research data repositories are online repositories that enable the preservation, curation and publication of research ‘products</a:t>
-            </a:r>
-            <a:r>
-              <a:rPr lang="en-GB" sz="2800" dirty="0" smtClean="0">
-                <a:solidFill>
-                  <a:srgbClr val="0070C0"/>
-                </a:solidFill>
-              </a:rPr>
-              <a:t>’:</a:t>
-            </a:r>
-            <a:endParaRPr lang="pl-PL" sz="2800" dirty="0" smtClean="0">
-              <a:solidFill>
-                <a:srgbClr val="0070C0"/>
-              </a:solidFill>
-            </a:endParaRPr>
-          </a:p>
-          <a:p>
-            <a:endParaRPr lang="en-GB" sz="2800" dirty="0">
-              <a:solidFill>
-                <a:srgbClr val="0070C0"/>
-              </a:solidFill>
-            </a:endParaRPr>
-          </a:p>
-          <a:p>
-            <a:pPr marL="457200" indent="-457200">
-              <a:buFont typeface="Arial" panose="020B0604020202020204" pitchFamily="34" charset="0"/>
-              <a:buChar char="•"/>
-            </a:pPr>
-            <a:r>
               <a:rPr lang="pl-PL" sz="2800" dirty="0" smtClean="0">
                 <a:solidFill>
                   <a:srgbClr val="0070C0"/>
                 </a:solidFill>
               </a:rPr>
-              <a:t>data</a:t>
-            </a:r>
-            <a:endParaRPr lang="en-GB" sz="2800" dirty="0">
-              <a:solidFill>
-                <a:srgbClr val="0070C0"/>
-              </a:solidFill>
-            </a:endParaRPr>
-          </a:p>
-          <a:p>
-            <a:pPr marL="457200" indent="-457200">
-              <a:buFont typeface="Arial" panose="020B0604020202020204" pitchFamily="34" charset="0"/>
-              <a:buChar char="•"/>
-            </a:pPr>
+              <a:t>Repositories are crucial for</a:t>
+            </a:r>
+          </a:p>
+          <a:p>
             <a:r>
               <a:rPr lang="pl-PL" sz="2800" dirty="0" smtClean="0">
                 <a:solidFill>
                   <a:srgbClr val="0070C0"/>
                 </a:solidFill>
               </a:rPr>
-              <a:t>code</a:t>
-            </a:r>
-          </a:p>
-          <a:p>
-            <a:pPr marL="457200" indent="-457200">
-              <a:buFont typeface="Arial" panose="020B0604020202020204" pitchFamily="34" charset="0"/>
-              <a:buChar char="•"/>
-            </a:pPr>
-            <a:r>
-              <a:rPr lang="pl-PL" sz="2800" dirty="0" smtClean="0">
-                <a:solidFill>
-                  <a:srgbClr val="0070C0"/>
-                </a:solidFill>
-              </a:rPr>
-              <a:t>protocols</a:t>
+              <a:t>FINDABLE and ACCESSIBLE</a:t>
             </a:r>
             <a:endParaRPr lang="en-GB" sz="2800" dirty="0">
               <a:solidFill>
@@ -6521,13 +7178,20 @@
     </p:spTree>
     <p:extLst>
       <p:ext uri="{BB962C8B-B14F-4D97-AF65-F5344CB8AC3E}">
-        <p14:creationId xmlns:p14="http://schemas.microsoft.com/office/powerpoint/2010/main" val="4286087962"/>
+        <p14:creationId xmlns:p14="http://schemas.microsoft.com/office/powerpoint/2010/main" val="3564542488"/>
       </p:ext>
     </p:extLst>
   </p:cSld>
   <p:clrMapOvr>
     <a:masterClrMapping/>
   </p:clrMapOvr>
+  <p:timing>
+    <p:tnLst>
+      <p:par>
+        <p:cTn id="1" dur="indefinite" restart="never" nodeType="tmRoot"/>
+      </p:par>
+    </p:tnLst>
+  </p:timing>
 </p:sld>
 </file>
 
@@ -6866,12 +7530,36 @@
               <a:t>Or </a:t>
             </a:r>
             <a:r>
+              <a:rPr lang="en-GB" dirty="0" smtClean="0">
+                <a:solidFill>
+                  <a:srgbClr val="0070C0"/>
+                </a:solidFill>
+              </a:rPr>
+              <a:t>domain</a:t>
+            </a:r>
+            <a:r>
+              <a:rPr lang="pl-PL" dirty="0" smtClean="0">
+                <a:solidFill>
+                  <a:srgbClr val="0070C0"/>
+                </a:solidFill>
+              </a:rPr>
+              <a:t> (type)</a:t>
+            </a:r>
+            <a:r>
+              <a:rPr lang="en-GB" dirty="0" smtClean="0">
+                <a:solidFill>
+                  <a:srgbClr val="0070C0"/>
+                </a:solidFill>
+              </a:rPr>
+              <a:t> </a:t>
+            </a:r>
+            <a:r>
               <a:rPr lang="en-GB" dirty="0">
                 <a:solidFill>
                   <a:srgbClr val="0070C0"/>
                 </a:solidFill>
               </a:rPr>
-              <a:t>domain specific, for example</a:t>
+              <a:t>specific, for example</a:t>
             </a:r>
             <a:r>
               <a:rPr lang="en-GB" dirty="0" smtClean="0">
@@ -7057,6 +7745,13 @@
   <p:clrMapOvr>
     <a:masterClrMapping/>
   </p:clrMapOvr>
+  <p:timing>
+    <p:tnLst>
+      <p:par>
+        <p:cTn id="1" dur="indefinite" restart="never" nodeType="tmRoot"/>
+      </p:par>
+    </p:tnLst>
+  </p:timing>
 </p:sld>
 </file>
 
@@ -7221,6 +7916,13 @@
   <p:clrMapOvr>
     <a:masterClrMapping/>
   </p:clrMapOvr>
+  <p:timing>
+    <p:tnLst>
+      <p:par>
+        <p:cTn id="1" dur="indefinite" restart="never" nodeType="tmRoot"/>
+      </p:par>
+    </p:tnLst>
+  </p:timing>
 </p:sld>
 </file>
 
@@ -7385,6 +8087,13 @@
   <p:clrMapOvr>
     <a:masterClrMapping/>
   </p:clrMapOvr>
+  <p:timing>
+    <p:tnLst>
+      <p:par>
+        <p:cTn id="1" dur="indefinite" restart="never" nodeType="tmRoot"/>
+      </p:par>
+    </p:tnLst>
+  </p:timing>
 </p:sld>
 </file>
 
@@ -7593,6 +8302,13 @@
   <p:clrMapOvr>
     <a:masterClrMapping/>
   </p:clrMapOvr>
+  <p:timing>
+    <p:tnLst>
+      <p:par>
+        <p:cTn id="1" dur="indefinite" restart="never" nodeType="tmRoot"/>
+      </p:par>
+    </p:tnLst>
+  </p:timing>
 </p:sld>
 </file>
 
@@ -7921,6 +8637,13 @@
   <p:clrMapOvr>
     <a:masterClrMapping/>
   </p:clrMapOvr>
+  <p:timing>
+    <p:tnLst>
+      <p:par>
+        <p:cTn id="1" dur="indefinite" restart="never" nodeType="tmRoot"/>
+      </p:par>
+    </p:tnLst>
+  </p:timing>
 </p:sld>
 </file>
 

</xml_diff>